<commit_message>
Fixed error in code
</commit_message>
<xml_diff>
--- a/presentation/presentation.pptx
+++ b/presentation/presentation.pptx
@@ -5,17 +5,19 @@
     <p:sldMasterId id="2147483648" r:id="rId1"/>
   </p:sldMasterIdLst>
   <p:notesMasterIdLst>
-    <p:notesMasterId r:id="rId7"/>
+    <p:notesMasterId r:id="rId9"/>
   </p:notesMasterIdLst>
   <p:handoutMasterIdLst>
-    <p:handoutMasterId r:id="rId8"/>
+    <p:handoutMasterId r:id="rId10"/>
   </p:handoutMasterIdLst>
   <p:sldIdLst>
     <p:sldId id="256" r:id="rId2"/>
     <p:sldId id="258" r:id="rId3"/>
     <p:sldId id="257" r:id="rId4"/>
     <p:sldId id="259" r:id="rId5"/>
-    <p:sldId id="260" r:id="rId6"/>
+    <p:sldId id="261" r:id="rId6"/>
+    <p:sldId id="260" r:id="rId7"/>
+    <p:sldId id="262" r:id="rId8"/>
   </p:sldIdLst>
   <p:sldSz cx="9144000" cy="6858000" type="screen4x3"/>
   <p:notesSz cx="6858000" cy="9144000"/>
@@ -4635,6 +4637,36 @@
           <a:chExt cx="0" cy="0"/>
         </a:xfrm>
       </p:grpSpPr>
+      <p:pic>
+        <p:nvPicPr>
+          <p:cNvPr id="5" name="Picture 4"/>
+          <p:cNvPicPr>
+            <a:picLocks noChangeAspect="1"/>
+          </p:cNvPicPr>
+          <p:nvPr/>
+        </p:nvPicPr>
+        <p:blipFill>
+          <a:blip r:embed="rId2">
+            <a:extLst>
+              <a:ext uri="{28A0092B-C50C-407E-A947-70E740481C1C}">
+                <a14:useLocalDpi xmlns:a14="http://schemas.microsoft.com/office/drawing/2010/main" val="0"/>
+              </a:ext>
+            </a:extLst>
+          </a:blip>
+          <a:stretch>
+            <a:fillRect/>
+          </a:stretch>
+        </p:blipFill>
+        <p:spPr>
+          <a:xfrm>
+            <a:off x="1735134" y="3931402"/>
+            <a:ext cx="5666554" cy="2645905"/>
+          </a:xfrm>
+          <a:prstGeom prst="rect">
+            <a:avLst/>
+          </a:prstGeom>
+        </p:spPr>
+      </p:pic>
       <p:sp>
         <p:nvSpPr>
           <p:cNvPr id="2" name="Title 1"/>
@@ -4680,8 +4712,8 @@
         </p:nvSpPr>
         <p:spPr>
           <a:xfrm>
-            <a:off x="457200" y="2013450"/>
-            <a:ext cx="8229600" cy="1499143"/>
+            <a:off x="457200" y="1608151"/>
+            <a:ext cx="8229600" cy="2552921"/>
           </a:xfrm>
         </p:spPr>
         <p:txBody>
@@ -4691,41 +4723,187 @@
           <a:lstStyle/>
           <a:p>
             <a:r>
-              <a:rPr lang="en-US" sz="2600" dirty="0"/>
-              <a:t>Data race bugs in multi-threaded environment</a:t>
-            </a:r>
-            <a:r>
-              <a:rPr lang="en-US" sz="2600" dirty="0" smtClean="0"/>
-              <a:t>:</a:t>
+              <a:rPr lang="en-US" sz="2800" dirty="0" err="1" smtClean="0"/>
+              <a:t>Pthreads</a:t>
+            </a:r>
+            <a:r>
+              <a:rPr lang="en-US" sz="2800" dirty="0" smtClean="0"/>
+              <a:t> fork-join parallelism</a:t>
             </a:r>
           </a:p>
           <a:p>
             <a:pPr lvl="1"/>
             <a:r>
-              <a:rPr lang="en-US" sz="2200" dirty="0" smtClean="0"/>
-              <a:t>One </a:t>
-            </a:r>
-            <a:r>
-              <a:rPr lang="en-US" sz="2200" dirty="0"/>
-              <a:t>of the most notorious sources of unsafe non-</a:t>
-            </a:r>
-            <a:r>
-              <a:rPr lang="en-US" sz="2200" dirty="0" smtClean="0"/>
-              <a:t>determinism</a:t>
-            </a:r>
-            <a:endParaRPr lang="en-US" sz="2200" dirty="0"/>
+              <a:rPr lang="en-US" sz="2400" dirty="0" smtClean="0"/>
+              <a:t>Master thread keeps doing its own work while it spawns new threads</a:t>
+            </a:r>
           </a:p>
           <a:p>
             <a:pPr lvl="1"/>
             <a:r>
-              <a:rPr lang="en-US" sz="2200" dirty="0"/>
-              <a:t>Identifying them in large OpenMP applications is highly </a:t>
-            </a:r>
-            <a:r>
-              <a:rPr lang="en-US" sz="2200" dirty="0" smtClean="0"/>
-              <a:t>challenging</a:t>
-            </a:r>
-            <a:endParaRPr lang="en-US" sz="2200" dirty="0">
+              <a:rPr lang="en-US" sz="2400" dirty="0" smtClean="0"/>
+              <a:t>Hard </a:t>
+            </a:r>
+            <a:r>
+              <a:rPr lang="en-US" sz="2400" dirty="0"/>
+              <a:t>to distinguish sequential from parallel </a:t>
+            </a:r>
+            <a:r>
+              <a:rPr lang="en-US" sz="2400" dirty="0" smtClean="0"/>
+              <a:t>instructions</a:t>
+            </a:r>
+          </a:p>
+          <a:p>
+            <a:pPr lvl="2"/>
+            <a:r>
+              <a:rPr lang="en-US" sz="2000" dirty="0" smtClean="0"/>
+              <a:t>Master thread may </a:t>
+            </a:r>
+            <a:r>
+              <a:rPr lang="en-US" sz="2000" dirty="0"/>
+              <a:t>access shared </a:t>
+            </a:r>
+            <a:r>
+              <a:rPr lang="en-US" sz="2000" dirty="0" smtClean="0"/>
+              <a:t>variables between other threads</a:t>
+            </a:r>
+          </a:p>
+          <a:p>
+            <a:pPr lvl="2"/>
+            <a:r>
+              <a:rPr lang="en-US" sz="2000" dirty="0" smtClean="0"/>
+              <a:t>Some threads may join later</a:t>
+            </a:r>
+            <a:endParaRPr lang="en-US" dirty="0"/>
+          </a:p>
+        </p:txBody>
+      </p:sp>
+    </p:spTree>
+    <p:extLst>
+      <p:ext uri="{BB962C8B-B14F-4D97-AF65-F5344CB8AC3E}">
+        <p14:creationId xmlns:p14="http://schemas.microsoft.com/office/powerpoint/2010/main" val="3259647918"/>
+      </p:ext>
+    </p:extLst>
+  </p:cSld>
+  <p:clrMapOvr>
+    <a:masterClrMapping/>
+  </p:clrMapOvr>
+  <p:timing>
+    <p:tnLst>
+      <p:par>
+        <p:cTn xmlns:p14="http://schemas.microsoft.com/office/powerpoint/2010/main" id="1" dur="indefinite" restart="never" nodeType="tmRoot"/>
+      </p:par>
+    </p:tnLst>
+  </p:timing>
+</p:sld>
+</file>
+
+<file path=ppt/slides/slide6.xml><?xml version="1.0" encoding="utf-8"?>
+<p:sld xmlns:a="http://schemas.openxmlformats.org/drawingml/2006/main" xmlns:r="http://schemas.openxmlformats.org/officeDocument/2006/relationships" xmlns:p="http://schemas.openxmlformats.org/presentationml/2006/main">
+  <p:cSld>
+    <p:spTree>
+      <p:nvGrpSpPr>
+        <p:cNvPr id="1" name=""/>
+        <p:cNvGrpSpPr/>
+        <p:nvPr/>
+      </p:nvGrpSpPr>
+      <p:grpSpPr>
+        <a:xfrm>
+          <a:off x="0" y="0"/>
+          <a:ext cx="0" cy="0"/>
+          <a:chOff x="0" y="0"/>
+          <a:chExt cx="0" cy="0"/>
+        </a:xfrm>
+      </p:grpSpPr>
+      <p:sp>
+        <p:nvSpPr>
+          <p:cNvPr id="2" name="Title 1"/>
+          <p:cNvSpPr>
+            <a:spLocks noGrp="1"/>
+          </p:cNvSpPr>
+          <p:nvPr>
+            <p:ph type="title"/>
+          </p:nvPr>
+        </p:nvSpPr>
+        <p:spPr/>
+        <p:txBody>
+          <a:bodyPr>
+            <a:normAutofit fontScale="90000"/>
+          </a:bodyPr>
+          <a:lstStyle/>
+          <a:p>
+            <a:pPr algn="l"/>
+            <a:r>
+              <a:rPr lang="en-US" dirty="0" smtClean="0"/>
+              <a:t>Static Analysis</a:t>
+            </a:r>
+            <a:br>
+              <a:rPr lang="en-US" dirty="0" smtClean="0"/>
+            </a:br>
+            <a:r>
+              <a:rPr lang="en-US" sz="2700" dirty="0" smtClean="0"/>
+              <a:t>Blacklisting Sequential Code</a:t>
+            </a:r>
+            <a:endParaRPr lang="en-US" sz="2700" dirty="0"/>
+          </a:p>
+        </p:txBody>
+      </p:sp>
+      <p:sp>
+        <p:nvSpPr>
+          <p:cNvPr id="11" name="Content Placeholder 15"/>
+          <p:cNvSpPr>
+            <a:spLocks noGrp="1"/>
+          </p:cNvSpPr>
+          <p:nvPr>
+            <p:ph idx="1"/>
+          </p:nvPr>
+        </p:nvSpPr>
+        <p:spPr>
+          <a:xfrm>
+            <a:off x="457200" y="1608151"/>
+            <a:ext cx="8229600" cy="2579941"/>
+          </a:xfrm>
+        </p:spPr>
+        <p:txBody>
+          <a:bodyPr>
+            <a:noAutofit/>
+          </a:bodyPr>
+          <a:lstStyle/>
+          <a:p>
+            <a:r>
+              <a:rPr lang="en-US" sz="2800" dirty="0" err="1" smtClean="0"/>
+              <a:t>OpenMP’s</a:t>
+            </a:r>
+            <a:r>
+              <a:rPr lang="en-US" sz="2800" dirty="0" smtClean="0"/>
+              <a:t> structured fork-join parallelism</a:t>
+            </a:r>
+          </a:p>
+          <a:p>
+            <a:pPr lvl="1"/>
+            <a:r>
+              <a:rPr lang="en-US" sz="2400" dirty="0" smtClean="0">
+                <a:effectLst/>
+              </a:rPr>
+              <a:t>Guarantee finding sequential instructions</a:t>
+            </a:r>
+          </a:p>
+          <a:p>
+            <a:pPr lvl="1"/>
+            <a:r>
+              <a:rPr lang="en-US" sz="2400" dirty="0" smtClean="0">
+                <a:effectLst/>
+              </a:rPr>
+              <a:t>Every instruction outside a OpenMP construct is executed by the master thread</a:t>
+            </a:r>
+          </a:p>
+          <a:p>
+            <a:pPr lvl="1"/>
+            <a:r>
+              <a:rPr lang="en-US" sz="2400" dirty="0" smtClean="0"/>
+              <a:t>Master thread take part of the parallel team</a:t>
+            </a:r>
+            <a:endParaRPr lang="en-US" sz="2400" dirty="0">
               <a:effectLst/>
             </a:endParaRPr>
           </a:p>
@@ -4753,7 +4931,7 @@
         </p:blipFill>
         <p:spPr>
           <a:xfrm>
-            <a:off x="457200" y="4091391"/>
+            <a:off x="457200" y="4280531"/>
             <a:ext cx="8229600" cy="2233225"/>
           </a:xfrm>
           <a:prstGeom prst="rect">
@@ -4765,6 +4943,503 @@
     <p:extLst>
       <p:ext uri="{BB962C8B-B14F-4D97-AF65-F5344CB8AC3E}">
         <p14:creationId xmlns:p14="http://schemas.microsoft.com/office/powerpoint/2010/main" val="3550153920"/>
+      </p:ext>
+    </p:extLst>
+  </p:cSld>
+  <p:clrMapOvr>
+    <a:masterClrMapping/>
+  </p:clrMapOvr>
+  <p:timing>
+    <p:tnLst>
+      <p:par>
+        <p:cTn xmlns:p14="http://schemas.microsoft.com/office/powerpoint/2010/main" id="1" dur="indefinite" restart="never" nodeType="tmRoot"/>
+      </p:par>
+    </p:tnLst>
+  </p:timing>
+</p:sld>
+</file>
+
+<file path=ppt/slides/slide7.xml><?xml version="1.0" encoding="utf-8"?>
+<p:sld xmlns:a="http://schemas.openxmlformats.org/drawingml/2006/main" xmlns:r="http://schemas.openxmlformats.org/officeDocument/2006/relationships" xmlns:p="http://schemas.openxmlformats.org/presentationml/2006/main">
+  <p:cSld>
+    <p:spTree>
+      <p:nvGrpSpPr>
+        <p:cNvPr id="1" name=""/>
+        <p:cNvGrpSpPr/>
+        <p:nvPr/>
+      </p:nvGrpSpPr>
+      <p:grpSpPr>
+        <a:xfrm>
+          <a:off x="0" y="0"/>
+          <a:ext cx="0" cy="0"/>
+          <a:chOff x="0" y="0"/>
+          <a:chExt cx="0" cy="0"/>
+        </a:xfrm>
+      </p:grpSpPr>
+      <p:sp>
+        <p:nvSpPr>
+          <p:cNvPr id="2" name="Title 1"/>
+          <p:cNvSpPr>
+            <a:spLocks noGrp="1"/>
+          </p:cNvSpPr>
+          <p:nvPr>
+            <p:ph type="title"/>
+          </p:nvPr>
+        </p:nvSpPr>
+        <p:spPr/>
+        <p:txBody>
+          <a:bodyPr>
+            <a:normAutofit fontScale="90000"/>
+          </a:bodyPr>
+          <a:lstStyle/>
+          <a:p>
+            <a:pPr algn="l"/>
+            <a:r>
+              <a:rPr lang="en-US" dirty="0" smtClean="0"/>
+              <a:t>Static Analysis</a:t>
+            </a:r>
+            <a:br>
+              <a:rPr lang="en-US" dirty="0" smtClean="0"/>
+            </a:br>
+            <a:r>
+              <a:rPr lang="en-US" sz="2700" dirty="0" smtClean="0"/>
+              <a:t>Data Dependency Analysis</a:t>
+            </a:r>
+            <a:endParaRPr lang="en-US" sz="2700" dirty="0"/>
+          </a:p>
+        </p:txBody>
+      </p:sp>
+      <p:sp>
+        <p:nvSpPr>
+          <p:cNvPr id="11" name="Content Placeholder 15"/>
+          <p:cNvSpPr>
+            <a:spLocks noGrp="1"/>
+          </p:cNvSpPr>
+          <p:nvPr>
+            <p:ph idx="1"/>
+          </p:nvPr>
+        </p:nvSpPr>
+        <p:spPr>
+          <a:xfrm>
+            <a:off x="457200" y="1608151"/>
+            <a:ext cx="8229600" cy="1539673"/>
+          </a:xfrm>
+        </p:spPr>
+        <p:txBody>
+          <a:bodyPr>
+            <a:noAutofit/>
+          </a:bodyPr>
+          <a:lstStyle/>
+          <a:p>
+            <a:r>
+              <a:rPr lang="en-US" sz="2800" dirty="0"/>
+              <a:t>Loop-carried data dependency </a:t>
+            </a:r>
+            <a:r>
+              <a:rPr lang="en-US" sz="2800" dirty="0" smtClean="0"/>
+              <a:t>analysis:</a:t>
+            </a:r>
+          </a:p>
+          <a:p>
+            <a:pPr lvl="1"/>
+            <a:r>
+              <a:rPr lang="en-US" sz="2400" dirty="0" smtClean="0"/>
+              <a:t>Parallel </a:t>
+            </a:r>
+            <a:r>
+              <a:rPr lang="en-US" sz="2400" dirty="0"/>
+              <a:t>for-loops with no dependencies are race </a:t>
+            </a:r>
+            <a:r>
+              <a:rPr lang="en-US" sz="2400" dirty="0" smtClean="0"/>
+              <a:t>free</a:t>
+            </a:r>
+          </a:p>
+          <a:p>
+            <a:pPr lvl="1"/>
+            <a:r>
+              <a:rPr lang="en-US" sz="2400" dirty="0" smtClean="0"/>
+              <a:t>Blacklisting </a:t>
+            </a:r>
+            <a:r>
+              <a:rPr lang="en-US" sz="2400" dirty="0"/>
+              <a:t>these regions from runtime </a:t>
+            </a:r>
+            <a:r>
+              <a:rPr lang="en-US" sz="2400" dirty="0" smtClean="0"/>
+              <a:t>analysis</a:t>
+            </a:r>
+            <a:endParaRPr lang="en-US" sz="2400" dirty="0">
+              <a:effectLst/>
+            </a:endParaRPr>
+          </a:p>
+        </p:txBody>
+      </p:sp>
+      <p:sp>
+        <p:nvSpPr>
+          <p:cNvPr id="3" name="Rectangle 2"/>
+          <p:cNvSpPr/>
+          <p:nvPr/>
+        </p:nvSpPr>
+        <p:spPr>
+          <a:xfrm>
+            <a:off x="4479667" y="3290501"/>
+            <a:ext cx="184666" cy="276999"/>
+          </a:xfrm>
+          <a:prstGeom prst="rect">
+            <a:avLst/>
+          </a:prstGeom>
+        </p:spPr>
+        <p:txBody>
+          <a:bodyPr wrap="none">
+            <a:spAutoFit/>
+          </a:bodyPr>
+          <a:lstStyle/>
+          <a:p>
+            <a:r>
+              <a:rPr lang="en-US" baseline="30000" dirty="0"/>
+              <a:t> </a:t>
+            </a:r>
+            <a:endParaRPr lang="en-US" dirty="0"/>
+          </a:p>
+        </p:txBody>
+      </p:sp>
+      <p:sp>
+        <p:nvSpPr>
+          <p:cNvPr id="4" name="TextBox 3"/>
+          <p:cNvSpPr txBox="1"/>
+          <p:nvPr/>
+        </p:nvSpPr>
+        <p:spPr>
+          <a:xfrm>
+            <a:off x="576846" y="3790576"/>
+            <a:ext cx="4063282" cy="1200329"/>
+          </a:xfrm>
+          <a:prstGeom prst="rect">
+            <a:avLst/>
+          </a:prstGeom>
+          <a:noFill/>
+        </p:spPr>
+        <p:txBody>
+          <a:bodyPr wrap="none" rtlCol="0">
+            <a:spAutoFit/>
+          </a:bodyPr>
+          <a:lstStyle/>
+          <a:p>
+            <a:r>
+              <a:rPr lang="en-US" dirty="0" smtClean="0">
+                <a:latin typeface="Courier New"/>
+                <a:cs typeface="Courier New"/>
+              </a:rPr>
+              <a:t>#pragma </a:t>
+            </a:r>
+            <a:r>
+              <a:rPr lang="en-US" dirty="0" err="1" smtClean="0">
+                <a:latin typeface="Courier New"/>
+                <a:cs typeface="Courier New"/>
+              </a:rPr>
+              <a:t>omp</a:t>
+            </a:r>
+            <a:r>
+              <a:rPr lang="en-US" dirty="0" smtClean="0">
+                <a:latin typeface="Courier New"/>
+                <a:cs typeface="Courier New"/>
+              </a:rPr>
+              <a:t> parallel for</a:t>
+            </a:r>
+          </a:p>
+          <a:p>
+            <a:r>
+              <a:rPr lang="en-US" dirty="0" smtClean="0">
+                <a:latin typeface="Courier New"/>
+                <a:cs typeface="Courier New"/>
+              </a:rPr>
+              <a:t>for(</a:t>
+            </a:r>
+            <a:r>
+              <a:rPr lang="en-US" dirty="0" err="1" smtClean="0">
+                <a:latin typeface="Courier New"/>
+                <a:cs typeface="Courier New"/>
+              </a:rPr>
+              <a:t>int</a:t>
+            </a:r>
+            <a:r>
+              <a:rPr lang="en-US" dirty="0" smtClean="0">
+                <a:latin typeface="Courier New"/>
+                <a:cs typeface="Courier New"/>
+              </a:rPr>
+              <a:t> </a:t>
+            </a:r>
+            <a:r>
+              <a:rPr lang="en-US" dirty="0" err="1" smtClean="0">
+                <a:latin typeface="Courier New"/>
+                <a:cs typeface="Courier New"/>
+              </a:rPr>
+              <a:t>i</a:t>
+            </a:r>
+            <a:r>
+              <a:rPr lang="en-US" dirty="0" smtClean="0">
+                <a:latin typeface="Courier New"/>
+                <a:cs typeface="Courier New"/>
+              </a:rPr>
+              <a:t> = 0; </a:t>
+            </a:r>
+            <a:r>
+              <a:rPr lang="en-US" dirty="0" err="1" smtClean="0">
+                <a:latin typeface="Courier New"/>
+                <a:cs typeface="Courier New"/>
+              </a:rPr>
+              <a:t>i</a:t>
+            </a:r>
+            <a:r>
+              <a:rPr lang="en-US" dirty="0" smtClean="0">
+                <a:latin typeface="Courier New"/>
+                <a:cs typeface="Courier New"/>
+              </a:rPr>
+              <a:t> &lt; N; </a:t>
+            </a:r>
+            <a:r>
+              <a:rPr lang="en-US" dirty="0" err="1" smtClean="0">
+                <a:latin typeface="Courier New"/>
+                <a:cs typeface="Courier New"/>
+              </a:rPr>
+              <a:t>i</a:t>
+            </a:r>
+            <a:r>
+              <a:rPr lang="en-US" dirty="0" smtClean="0">
+                <a:latin typeface="Courier New"/>
+                <a:cs typeface="Courier New"/>
+              </a:rPr>
+              <a:t>++) {</a:t>
+            </a:r>
+          </a:p>
+          <a:p>
+            <a:r>
+              <a:rPr lang="en-US" dirty="0">
+                <a:latin typeface="Courier New"/>
+                <a:cs typeface="Courier New"/>
+              </a:rPr>
+              <a:t> </a:t>
+            </a:r>
+            <a:r>
+              <a:rPr lang="en-US" dirty="0" smtClean="0">
+                <a:latin typeface="Courier New"/>
+                <a:cs typeface="Courier New"/>
+              </a:rPr>
+              <a:t>  a[</a:t>
+            </a:r>
+            <a:r>
+              <a:rPr lang="en-US" dirty="0" err="1" smtClean="0">
+                <a:latin typeface="Courier New"/>
+                <a:cs typeface="Courier New"/>
+              </a:rPr>
+              <a:t>i</a:t>
+            </a:r>
+            <a:r>
+              <a:rPr lang="en-US" dirty="0" smtClean="0">
+                <a:latin typeface="Courier New"/>
+                <a:cs typeface="Courier New"/>
+              </a:rPr>
+              <a:t>] = a[</a:t>
+            </a:r>
+            <a:r>
+              <a:rPr lang="en-US" dirty="0" err="1" smtClean="0">
+                <a:latin typeface="Courier New"/>
+                <a:cs typeface="Courier New"/>
+              </a:rPr>
+              <a:t>i</a:t>
+            </a:r>
+            <a:r>
+              <a:rPr lang="en-US" dirty="0" smtClean="0">
+                <a:latin typeface="Courier New"/>
+                <a:cs typeface="Courier New"/>
+              </a:rPr>
+              <a:t>] + 1;</a:t>
+            </a:r>
+          </a:p>
+          <a:p>
+            <a:r>
+              <a:rPr lang="en-US" dirty="0">
+                <a:latin typeface="Courier New"/>
+                <a:cs typeface="Courier New"/>
+              </a:rPr>
+              <a:t>}</a:t>
+            </a:r>
+          </a:p>
+        </p:txBody>
+      </p:sp>
+      <p:sp>
+        <p:nvSpPr>
+          <p:cNvPr id="7" name="TextBox 6"/>
+          <p:cNvSpPr txBox="1"/>
+          <p:nvPr/>
+        </p:nvSpPr>
+        <p:spPr>
+          <a:xfrm>
+            <a:off x="4792528" y="3938981"/>
+            <a:ext cx="4063282" cy="1200329"/>
+          </a:xfrm>
+          <a:prstGeom prst="rect">
+            <a:avLst/>
+          </a:prstGeom>
+          <a:noFill/>
+        </p:spPr>
+        <p:txBody>
+          <a:bodyPr wrap="none" rtlCol="0">
+            <a:spAutoFit/>
+          </a:bodyPr>
+          <a:lstStyle/>
+          <a:p>
+            <a:r>
+              <a:rPr lang="en-US" dirty="0" smtClean="0">
+                <a:latin typeface="Courier New"/>
+                <a:cs typeface="Courier New"/>
+              </a:rPr>
+              <a:t>#pragma </a:t>
+            </a:r>
+            <a:r>
+              <a:rPr lang="en-US" dirty="0" err="1" smtClean="0">
+                <a:latin typeface="Courier New"/>
+                <a:cs typeface="Courier New"/>
+              </a:rPr>
+              <a:t>omp</a:t>
+            </a:r>
+            <a:r>
+              <a:rPr lang="en-US" dirty="0" smtClean="0">
+                <a:latin typeface="Courier New"/>
+                <a:cs typeface="Courier New"/>
+              </a:rPr>
+              <a:t> parallel for</a:t>
+            </a:r>
+          </a:p>
+          <a:p>
+            <a:r>
+              <a:rPr lang="en-US" dirty="0" smtClean="0">
+                <a:latin typeface="Courier New"/>
+                <a:cs typeface="Courier New"/>
+              </a:rPr>
+              <a:t>for(</a:t>
+            </a:r>
+            <a:r>
+              <a:rPr lang="en-US" dirty="0" err="1" smtClean="0">
+                <a:latin typeface="Courier New"/>
+                <a:cs typeface="Courier New"/>
+              </a:rPr>
+              <a:t>int</a:t>
+            </a:r>
+            <a:r>
+              <a:rPr lang="en-US" dirty="0" smtClean="0">
+                <a:latin typeface="Courier New"/>
+                <a:cs typeface="Courier New"/>
+              </a:rPr>
+              <a:t> </a:t>
+            </a:r>
+            <a:r>
+              <a:rPr lang="en-US" dirty="0" err="1" smtClean="0">
+                <a:latin typeface="Courier New"/>
+                <a:cs typeface="Courier New"/>
+              </a:rPr>
+              <a:t>i</a:t>
+            </a:r>
+            <a:r>
+              <a:rPr lang="en-US" dirty="0" smtClean="0">
+                <a:latin typeface="Courier New"/>
+                <a:cs typeface="Courier New"/>
+              </a:rPr>
+              <a:t> = 0; </a:t>
+            </a:r>
+            <a:r>
+              <a:rPr lang="en-US" dirty="0" err="1" smtClean="0">
+                <a:latin typeface="Courier New"/>
+                <a:cs typeface="Courier New"/>
+              </a:rPr>
+              <a:t>i</a:t>
+            </a:r>
+            <a:r>
+              <a:rPr lang="en-US" dirty="0" smtClean="0">
+                <a:latin typeface="Courier New"/>
+                <a:cs typeface="Courier New"/>
+              </a:rPr>
+              <a:t> &lt; N; </a:t>
+            </a:r>
+            <a:r>
+              <a:rPr lang="en-US" dirty="0" err="1" smtClean="0">
+                <a:latin typeface="Courier New"/>
+                <a:cs typeface="Courier New"/>
+              </a:rPr>
+              <a:t>i</a:t>
+            </a:r>
+            <a:r>
+              <a:rPr lang="en-US" dirty="0" smtClean="0">
+                <a:latin typeface="Courier New"/>
+                <a:cs typeface="Courier New"/>
+              </a:rPr>
+              <a:t>++) {</a:t>
+            </a:r>
+          </a:p>
+          <a:p>
+            <a:r>
+              <a:rPr lang="en-US" dirty="0">
+                <a:latin typeface="Courier New"/>
+                <a:cs typeface="Courier New"/>
+              </a:rPr>
+              <a:t> </a:t>
+            </a:r>
+            <a:r>
+              <a:rPr lang="en-US" dirty="0" smtClean="0">
+                <a:latin typeface="Courier New"/>
+                <a:cs typeface="Courier New"/>
+              </a:rPr>
+              <a:t>  a[</a:t>
+            </a:r>
+            <a:r>
+              <a:rPr lang="en-US" dirty="0" err="1" smtClean="0">
+                <a:latin typeface="Courier New"/>
+                <a:cs typeface="Courier New"/>
+              </a:rPr>
+              <a:t>i</a:t>
+            </a:r>
+            <a:r>
+              <a:rPr lang="en-US" dirty="0" smtClean="0">
+                <a:latin typeface="Courier New"/>
+                <a:cs typeface="Courier New"/>
+              </a:rPr>
+              <a:t>] = a[</a:t>
+            </a:r>
+            <a:r>
+              <a:rPr lang="en-US" dirty="0" err="1" smtClean="0">
+                <a:latin typeface="Courier New"/>
+                <a:cs typeface="Courier New"/>
+              </a:rPr>
+              <a:t>i</a:t>
+            </a:r>
+            <a:r>
+              <a:rPr lang="en-US" smtClean="0">
+                <a:latin typeface="Courier New"/>
+                <a:cs typeface="Courier New"/>
+              </a:rPr>
+              <a:t> - 1];</a:t>
+            </a:r>
+            <a:endParaRPr lang="en-US" dirty="0" smtClean="0">
+              <a:latin typeface="Courier New"/>
+              <a:cs typeface="Courier New"/>
+            </a:endParaRPr>
+          </a:p>
+          <a:p>
+            <a:r>
+              <a:rPr lang="en-US" dirty="0">
+                <a:latin typeface="Courier New"/>
+                <a:cs typeface="Courier New"/>
+              </a:rPr>
+              <a:t>}</a:t>
+            </a:r>
+          </a:p>
+        </p:txBody>
+      </p:sp>
+    </p:spTree>
+    <p:extLst>
+      <p:ext uri="{BB962C8B-B14F-4D97-AF65-F5344CB8AC3E}">
+        <p14:creationId xmlns:p14="http://schemas.microsoft.com/office/powerpoint/2010/main" val="1249774231"/>
       </p:ext>
     </p:extLst>
   </p:cSld>

</xml_diff>

<commit_message>
work in progress presentation:
</commit_message>
<xml_diff>
--- a/presentation/presentation.pptx
+++ b/presentation/presentation.pptx
@@ -5,20 +5,28 @@
     <p:sldMasterId id="2147483648" r:id="rId1"/>
   </p:sldMasterIdLst>
   <p:notesMasterIdLst>
-    <p:notesMasterId r:id="rId10"/>
+    <p:notesMasterId r:id="rId18"/>
   </p:notesMasterIdLst>
   <p:handoutMasterIdLst>
-    <p:handoutMasterId r:id="rId11"/>
+    <p:handoutMasterId r:id="rId19"/>
   </p:handoutMasterIdLst>
   <p:sldIdLst>
     <p:sldId id="256" r:id="rId2"/>
-    <p:sldId id="258" r:id="rId3"/>
-    <p:sldId id="257" r:id="rId4"/>
-    <p:sldId id="259" r:id="rId5"/>
-    <p:sldId id="261" r:id="rId6"/>
-    <p:sldId id="260" r:id="rId7"/>
-    <p:sldId id="262" r:id="rId8"/>
-    <p:sldId id="263" r:id="rId9"/>
+    <p:sldId id="270" r:id="rId3"/>
+    <p:sldId id="271" r:id="rId4"/>
+    <p:sldId id="257" r:id="rId5"/>
+    <p:sldId id="259" r:id="rId6"/>
+    <p:sldId id="264" r:id="rId7"/>
+    <p:sldId id="265" r:id="rId8"/>
+    <p:sldId id="266" r:id="rId9"/>
+    <p:sldId id="267" r:id="rId10"/>
+    <p:sldId id="272" r:id="rId11"/>
+    <p:sldId id="261" r:id="rId12"/>
+    <p:sldId id="260" r:id="rId13"/>
+    <p:sldId id="262" r:id="rId14"/>
+    <p:sldId id="263" r:id="rId15"/>
+    <p:sldId id="268" r:id="rId16"/>
+    <p:sldId id="269" r:id="rId17"/>
   </p:sldIdLst>
   <p:sldSz cx="9144000" cy="6858000" type="screen4x3"/>
   <p:notesSz cx="6858000" cy="9144000"/>
@@ -202,7 +210,7 @@
           <a:p>
             <a:fld id="{79A57324-CFFD-9E40-8C3B-390D028943AC}" type="datetimeFigureOut">
               <a:rPr lang="en-US" smtClean="0"/>
-              <a:t>4/26/16</a:t>
+              <a:t>4/27/16</a:t>
             </a:fld>
             <a:endParaRPr lang="en-US"/>
           </a:p>
@@ -368,7 +376,7 @@
           <a:p>
             <a:fld id="{C2E09A59-6BEC-5447-ACE7-43110F78B9D5}" type="datetimeFigureOut">
               <a:rPr lang="en-US" smtClean="0"/>
-              <a:t>4/26/16</a:t>
+              <a:t>4/27/16</a:t>
             </a:fld>
             <a:endParaRPr lang="en-US"/>
           </a:p>
@@ -786,7 +794,7 @@
           <a:p>
             <a:fld id="{A1129A4B-D84D-454A-A538-E27153618149}" type="slidenum">
               <a:rPr lang="en-US" smtClean="0"/>
-              <a:t>7</a:t>
+              <a:t>11</a:t>
             </a:fld>
             <a:endParaRPr lang="en-US"/>
           </a:p>
@@ -795,7 +803,7 @@
     </p:spTree>
     <p:extLst>
       <p:ext uri="{BB962C8B-B14F-4D97-AF65-F5344CB8AC3E}">
-        <p14:creationId xmlns:p14="http://schemas.microsoft.com/office/powerpoint/2010/main" val="2140486430"/>
+        <p14:creationId xmlns:p14="http://schemas.microsoft.com/office/powerpoint/2010/main" val="2269412645"/>
       </p:ext>
     </p:extLst>
   </p:cSld>
@@ -870,7 +878,91 @@
           <a:p>
             <a:fld id="{A1129A4B-D84D-454A-A538-E27153618149}" type="slidenum">
               <a:rPr lang="en-US" smtClean="0"/>
-              <a:t>8</a:t>
+              <a:t>13</a:t>
+            </a:fld>
+            <a:endParaRPr lang="en-US"/>
+          </a:p>
+        </p:txBody>
+      </p:sp>
+    </p:spTree>
+    <p:extLst>
+      <p:ext uri="{BB962C8B-B14F-4D97-AF65-F5344CB8AC3E}">
+        <p14:creationId xmlns:p14="http://schemas.microsoft.com/office/powerpoint/2010/main" val="2140486430"/>
+      </p:ext>
+    </p:extLst>
+  </p:cSld>
+  <p:clrMapOvr>
+    <a:masterClrMapping/>
+  </p:clrMapOvr>
+</p:notes>
+</file>
+
+<file path=ppt/notesSlides/notesSlide4.xml><?xml version="1.0" encoding="utf-8"?>
+<p:notes xmlns:a="http://schemas.openxmlformats.org/drawingml/2006/main" xmlns:r="http://schemas.openxmlformats.org/officeDocument/2006/relationships" xmlns:p="http://schemas.openxmlformats.org/presentationml/2006/main">
+  <p:cSld>
+    <p:spTree>
+      <p:nvGrpSpPr>
+        <p:cNvPr id="1" name=""/>
+        <p:cNvGrpSpPr/>
+        <p:nvPr/>
+      </p:nvGrpSpPr>
+      <p:grpSpPr>
+        <a:xfrm>
+          <a:off x="0" y="0"/>
+          <a:ext cx="0" cy="0"/>
+          <a:chOff x="0" y="0"/>
+          <a:chExt cx="0" cy="0"/>
+        </a:xfrm>
+      </p:grpSpPr>
+      <p:sp>
+        <p:nvSpPr>
+          <p:cNvPr id="2" name="Slide Image Placeholder 1"/>
+          <p:cNvSpPr>
+            <a:spLocks noGrp="1" noRot="1" noChangeAspect="1"/>
+          </p:cNvSpPr>
+          <p:nvPr>
+            <p:ph type="sldImg"/>
+          </p:nvPr>
+        </p:nvSpPr>
+        <p:spPr/>
+      </p:sp>
+      <p:sp>
+        <p:nvSpPr>
+          <p:cNvPr id="3" name="Notes Placeholder 2"/>
+          <p:cNvSpPr>
+            <a:spLocks noGrp="1"/>
+          </p:cNvSpPr>
+          <p:nvPr>
+            <p:ph type="body" idx="1"/>
+          </p:nvPr>
+        </p:nvSpPr>
+        <p:spPr/>
+        <p:txBody>
+          <a:bodyPr/>
+          <a:lstStyle/>
+          <a:p>
+            <a:endParaRPr lang="en-US" dirty="0"/>
+          </a:p>
+        </p:txBody>
+      </p:sp>
+      <p:sp>
+        <p:nvSpPr>
+          <p:cNvPr id="4" name="Slide Number Placeholder 3"/>
+          <p:cNvSpPr>
+            <a:spLocks noGrp="1"/>
+          </p:cNvSpPr>
+          <p:nvPr>
+            <p:ph type="sldNum" sz="quarter" idx="10"/>
+          </p:nvPr>
+        </p:nvSpPr>
+        <p:spPr/>
+        <p:txBody>
+          <a:bodyPr/>
+          <a:lstStyle/>
+          <a:p>
+            <a:fld id="{A1129A4B-D84D-454A-A538-E27153618149}" type="slidenum">
+              <a:rPr lang="en-US" smtClean="0"/>
+              <a:t>14</a:t>
             </a:fld>
             <a:endParaRPr lang="en-US"/>
           </a:p>
@@ -1070,7 +1162,7 @@
           <a:p>
             <a:fld id="{FB501018-9FF2-9148-B5C3-B3E8A6997B04}" type="datetime1">
               <a:rPr lang="en-US" smtClean="0"/>
-              <a:t>4/26/16</a:t>
+              <a:t>4/27/16</a:t>
             </a:fld>
             <a:endParaRPr lang="en-US"/>
           </a:p>
@@ -1240,7 +1332,7 @@
           <a:p>
             <a:fld id="{3395D596-0EE7-CB48-91ED-137BFC3C3D0A}" type="datetime1">
               <a:rPr lang="en-US" smtClean="0"/>
-              <a:t>4/26/16</a:t>
+              <a:t>4/27/16</a:t>
             </a:fld>
             <a:endParaRPr lang="en-US"/>
           </a:p>
@@ -1420,7 +1512,7 @@
           <a:p>
             <a:fld id="{2AAD91EA-B91A-974B-B02E-11C6BFE223F1}" type="datetime1">
               <a:rPr lang="en-US" smtClean="0"/>
-              <a:t>4/26/16</a:t>
+              <a:t>4/27/16</a:t>
             </a:fld>
             <a:endParaRPr lang="en-US"/>
           </a:p>
@@ -1590,7 +1682,7 @@
           <a:p>
             <a:fld id="{A28FA02A-4C34-4740-A780-9C675F330F99}" type="datetime1">
               <a:rPr lang="en-US" smtClean="0"/>
-              <a:t>4/26/16</a:t>
+              <a:t>4/27/16</a:t>
             </a:fld>
             <a:endParaRPr lang="en-US"/>
           </a:p>
@@ -1836,7 +1928,7 @@
           <a:p>
             <a:fld id="{EFE54A8F-22C6-A846-AB94-796985C14CD6}" type="datetime1">
               <a:rPr lang="en-US" smtClean="0"/>
-              <a:t>4/26/16</a:t>
+              <a:t>4/27/16</a:t>
             </a:fld>
             <a:endParaRPr lang="en-US"/>
           </a:p>
@@ -2124,7 +2216,7 @@
           <a:p>
             <a:fld id="{B8996FFA-2B03-3641-9B11-A475983ABC6E}" type="datetime1">
               <a:rPr lang="en-US" smtClean="0"/>
-              <a:t>4/26/16</a:t>
+              <a:t>4/27/16</a:t>
             </a:fld>
             <a:endParaRPr lang="en-US"/>
           </a:p>
@@ -2546,7 +2638,7 @@
           <a:p>
             <a:fld id="{14E9E958-28EF-1C45-AC65-BCA15E105D6B}" type="datetime1">
               <a:rPr lang="en-US" smtClean="0"/>
-              <a:t>4/26/16</a:t>
+              <a:t>4/27/16</a:t>
             </a:fld>
             <a:endParaRPr lang="en-US"/>
           </a:p>
@@ -2664,7 +2756,7 @@
           <a:p>
             <a:fld id="{7FADFE53-BD08-B146-BE65-0F1F1A272720}" type="datetime1">
               <a:rPr lang="en-US" smtClean="0"/>
-              <a:t>4/26/16</a:t>
+              <a:t>4/27/16</a:t>
             </a:fld>
             <a:endParaRPr lang="en-US"/>
           </a:p>
@@ -2759,7 +2851,7 @@
           <a:p>
             <a:fld id="{EFF5714E-CAE9-CB4E-A8AE-5B6B95366052}" type="datetime1">
               <a:rPr lang="en-US" smtClean="0"/>
-              <a:t>4/26/16</a:t>
+              <a:t>4/27/16</a:t>
             </a:fld>
             <a:endParaRPr lang="en-US"/>
           </a:p>
@@ -3036,7 +3128,7 @@
           <a:p>
             <a:fld id="{AEAEEDD5-7292-1E45-8CDB-5927E5506F44}" type="datetime1">
               <a:rPr lang="en-US" smtClean="0"/>
-              <a:t>4/26/16</a:t>
+              <a:t>4/27/16</a:t>
             </a:fld>
             <a:endParaRPr lang="en-US"/>
           </a:p>
@@ -3289,7 +3381,7 @@
           <a:p>
             <a:fld id="{BBCC523B-1C4F-D744-9F12-C0AAD73D1AD6}" type="datetime1">
               <a:rPr lang="en-US" smtClean="0"/>
-              <a:t>4/26/16</a:t>
+              <a:t>4/27/16</a:t>
             </a:fld>
             <a:endParaRPr lang="en-US"/>
           </a:p>
@@ -3502,7 +3594,7 @@
           <a:p>
             <a:fld id="{F8A7624F-586D-C642-A187-F76EDE341DEF}" type="datetime1">
               <a:rPr lang="en-US" smtClean="0"/>
-              <a:t>4/26/16</a:t>
+              <a:t>4/27/16</a:t>
             </a:fld>
             <a:endParaRPr lang="en-US"/>
           </a:p>
@@ -4165,10 +4257,6 @@
               </a:rPr>
               <a:t>May 5, 2016</a:t>
             </a:r>
-            <a:endParaRPr lang="en-US" sz="2400" dirty="0">
-              <a:latin typeface="Calibri"/>
-              <a:cs typeface="Calibri"/>
-            </a:endParaRPr>
           </a:p>
         </p:txBody>
       </p:sp>
@@ -4176,6 +4264,1664 @@
     <p:extLst>
       <p:ext uri="{BB962C8B-B14F-4D97-AF65-F5344CB8AC3E}">
         <p14:creationId xmlns:p14="http://schemas.microsoft.com/office/powerpoint/2010/main" val="3062983809"/>
+      </p:ext>
+    </p:extLst>
+  </p:cSld>
+  <p:clrMapOvr>
+    <a:masterClrMapping/>
+  </p:clrMapOvr>
+  <p:timing>
+    <p:tnLst>
+      <p:par>
+        <p:cTn xmlns:p14="http://schemas.microsoft.com/office/powerpoint/2010/main" id="1" dur="indefinite" restart="never" nodeType="tmRoot"/>
+      </p:par>
+    </p:tnLst>
+  </p:timing>
+</p:sld>
+</file>
+
+<file path=ppt/slides/slide10.xml><?xml version="1.0" encoding="utf-8"?>
+<p:sld xmlns:a="http://schemas.openxmlformats.org/drawingml/2006/main" xmlns:r="http://schemas.openxmlformats.org/officeDocument/2006/relationships" xmlns:p="http://schemas.openxmlformats.org/presentationml/2006/main">
+  <p:cSld>
+    <p:spTree>
+      <p:nvGrpSpPr>
+        <p:cNvPr id="1" name=""/>
+        <p:cNvGrpSpPr/>
+        <p:nvPr/>
+      </p:nvGrpSpPr>
+      <p:grpSpPr>
+        <a:xfrm>
+          <a:off x="0" y="0"/>
+          <a:ext cx="0" cy="0"/>
+          <a:chOff x="0" y="0"/>
+          <a:chExt cx="0" cy="0"/>
+        </a:xfrm>
+      </p:grpSpPr>
+      <p:sp>
+        <p:nvSpPr>
+          <p:cNvPr id="2" name="Title 1"/>
+          <p:cNvSpPr>
+            <a:spLocks noGrp="1"/>
+          </p:cNvSpPr>
+          <p:nvPr>
+            <p:ph type="title"/>
+          </p:nvPr>
+        </p:nvSpPr>
+        <p:spPr/>
+        <p:txBody>
+          <a:bodyPr>
+            <a:normAutofit fontScale="90000"/>
+          </a:bodyPr>
+          <a:lstStyle/>
+          <a:p>
+            <a:pPr algn="l"/>
+            <a:r>
+              <a:rPr lang="en-US" sz="4900" dirty="0" smtClean="0"/>
+              <a:t>Overall Research Plan</a:t>
+            </a:r>
+            <a:r>
+              <a:rPr lang="en-US" dirty="0" smtClean="0"/>
+              <a:t/>
+            </a:r>
+            <a:br>
+              <a:rPr lang="en-US" dirty="0" smtClean="0"/>
+            </a:br>
+            <a:r>
+              <a:rPr lang="en-US" sz="2800" dirty="0" smtClean="0"/>
+              <a:t>Low overhead data race detection for OpenMP</a:t>
+            </a:r>
+            <a:endParaRPr lang="en-US" sz="2700" dirty="0"/>
+          </a:p>
+        </p:txBody>
+      </p:sp>
+      <p:sp>
+        <p:nvSpPr>
+          <p:cNvPr id="5" name="Content Placeholder 4"/>
+          <p:cNvSpPr>
+            <a:spLocks noGrp="1"/>
+          </p:cNvSpPr>
+          <p:nvPr>
+            <p:ph idx="1"/>
+          </p:nvPr>
+        </p:nvSpPr>
+        <p:spPr/>
+        <p:txBody>
+          <a:bodyPr/>
+          <a:lstStyle/>
+          <a:p>
+            <a:endParaRPr lang="en-US"/>
+          </a:p>
+        </p:txBody>
+      </p:sp>
+    </p:spTree>
+    <p:extLst>
+      <p:ext uri="{BB962C8B-B14F-4D97-AF65-F5344CB8AC3E}">
+        <p14:creationId xmlns:p14="http://schemas.microsoft.com/office/powerpoint/2010/main" val="285783419"/>
+      </p:ext>
+    </p:extLst>
+  </p:cSld>
+  <p:clrMapOvr>
+    <a:masterClrMapping/>
+  </p:clrMapOvr>
+  <p:timing>
+    <p:tnLst>
+      <p:par>
+        <p:cTn xmlns:p14="http://schemas.microsoft.com/office/powerpoint/2010/main" id="1" dur="indefinite" restart="never" nodeType="tmRoot"/>
+      </p:par>
+    </p:tnLst>
+  </p:timing>
+</p:sld>
+</file>
+
+<file path=ppt/slides/slide11.xml><?xml version="1.0" encoding="utf-8"?>
+<p:sld xmlns:a="http://schemas.openxmlformats.org/drawingml/2006/main" xmlns:r="http://schemas.openxmlformats.org/officeDocument/2006/relationships" xmlns:p="http://schemas.openxmlformats.org/presentationml/2006/main">
+  <p:cSld>
+    <p:spTree>
+      <p:nvGrpSpPr>
+        <p:cNvPr id="1" name=""/>
+        <p:cNvGrpSpPr/>
+        <p:nvPr/>
+      </p:nvGrpSpPr>
+      <p:grpSpPr>
+        <a:xfrm>
+          <a:off x="0" y="0"/>
+          <a:ext cx="0" cy="0"/>
+          <a:chOff x="0" y="0"/>
+          <a:chExt cx="0" cy="0"/>
+        </a:xfrm>
+      </p:grpSpPr>
+      <p:pic>
+        <p:nvPicPr>
+          <p:cNvPr id="5" name="Picture 4"/>
+          <p:cNvPicPr>
+            <a:picLocks noChangeAspect="1"/>
+          </p:cNvPicPr>
+          <p:nvPr/>
+        </p:nvPicPr>
+        <p:blipFill>
+          <a:blip r:embed="rId3">
+            <a:extLst>
+              <a:ext uri="{28A0092B-C50C-407E-A947-70E740481C1C}">
+                <a14:useLocalDpi xmlns:a14="http://schemas.microsoft.com/office/drawing/2010/main" val="0"/>
+              </a:ext>
+            </a:extLst>
+          </a:blip>
+          <a:stretch>
+            <a:fillRect/>
+          </a:stretch>
+        </p:blipFill>
+        <p:spPr>
+          <a:xfrm>
+            <a:off x="1735134" y="3931402"/>
+            <a:ext cx="5666554" cy="2645905"/>
+          </a:xfrm>
+          <a:prstGeom prst="rect">
+            <a:avLst/>
+          </a:prstGeom>
+        </p:spPr>
+      </p:pic>
+      <p:sp>
+        <p:nvSpPr>
+          <p:cNvPr id="2" name="Title 1"/>
+          <p:cNvSpPr>
+            <a:spLocks noGrp="1"/>
+          </p:cNvSpPr>
+          <p:nvPr>
+            <p:ph type="title"/>
+          </p:nvPr>
+        </p:nvSpPr>
+        <p:spPr/>
+        <p:txBody>
+          <a:bodyPr>
+            <a:normAutofit fontScale="90000"/>
+          </a:bodyPr>
+          <a:lstStyle/>
+          <a:p>
+            <a:pPr algn="l"/>
+            <a:r>
+              <a:rPr lang="en-US" dirty="0" smtClean="0"/>
+              <a:t>Static Analysis</a:t>
+            </a:r>
+            <a:br>
+              <a:rPr lang="en-US" dirty="0" smtClean="0"/>
+            </a:br>
+            <a:r>
+              <a:rPr lang="en-US" sz="2700" dirty="0" smtClean="0"/>
+              <a:t>Blacklisting Sequential Code</a:t>
+            </a:r>
+            <a:endParaRPr lang="en-US" sz="2700" dirty="0"/>
+          </a:p>
+        </p:txBody>
+      </p:sp>
+      <p:sp>
+        <p:nvSpPr>
+          <p:cNvPr id="11" name="Content Placeholder 15"/>
+          <p:cNvSpPr>
+            <a:spLocks noGrp="1"/>
+          </p:cNvSpPr>
+          <p:nvPr>
+            <p:ph idx="1"/>
+          </p:nvPr>
+        </p:nvSpPr>
+        <p:spPr>
+          <a:xfrm>
+            <a:off x="457200" y="1608151"/>
+            <a:ext cx="8229600" cy="2552921"/>
+          </a:xfrm>
+        </p:spPr>
+        <p:txBody>
+          <a:bodyPr>
+            <a:noAutofit/>
+          </a:bodyPr>
+          <a:lstStyle/>
+          <a:p>
+            <a:r>
+              <a:rPr lang="en-US" sz="2800" dirty="0" err="1" smtClean="0"/>
+              <a:t>Pthreads</a:t>
+            </a:r>
+            <a:r>
+              <a:rPr lang="en-US" sz="2800" dirty="0" smtClean="0"/>
+              <a:t> fork-join parallelism</a:t>
+            </a:r>
+          </a:p>
+          <a:p>
+            <a:pPr lvl="1"/>
+            <a:r>
+              <a:rPr lang="en-US" sz="2400" dirty="0" smtClean="0"/>
+              <a:t>Master thread keeps doing its own work while it spawns new threads</a:t>
+            </a:r>
+          </a:p>
+          <a:p>
+            <a:pPr lvl="1"/>
+            <a:r>
+              <a:rPr lang="en-US" sz="2400" dirty="0" smtClean="0"/>
+              <a:t>Hard </a:t>
+            </a:r>
+            <a:r>
+              <a:rPr lang="en-US" sz="2400" dirty="0"/>
+              <a:t>to distinguish sequential from parallel </a:t>
+            </a:r>
+            <a:r>
+              <a:rPr lang="en-US" sz="2400" dirty="0" smtClean="0"/>
+              <a:t>instructions</a:t>
+            </a:r>
+          </a:p>
+          <a:p>
+            <a:pPr lvl="2"/>
+            <a:r>
+              <a:rPr lang="en-US" sz="2000" dirty="0" smtClean="0"/>
+              <a:t>Master thread may </a:t>
+            </a:r>
+            <a:r>
+              <a:rPr lang="en-US" sz="2000" dirty="0"/>
+              <a:t>access shared </a:t>
+            </a:r>
+            <a:r>
+              <a:rPr lang="en-US" sz="2000" dirty="0" smtClean="0"/>
+              <a:t>variables between other threads</a:t>
+            </a:r>
+          </a:p>
+          <a:p>
+            <a:pPr lvl="2"/>
+            <a:r>
+              <a:rPr lang="en-US" sz="2000" dirty="0" smtClean="0"/>
+              <a:t>Some threads may join later</a:t>
+            </a:r>
+            <a:endParaRPr lang="en-US" dirty="0"/>
+          </a:p>
+        </p:txBody>
+      </p:sp>
+    </p:spTree>
+    <p:extLst>
+      <p:ext uri="{BB962C8B-B14F-4D97-AF65-F5344CB8AC3E}">
+        <p14:creationId xmlns:p14="http://schemas.microsoft.com/office/powerpoint/2010/main" val="3259647918"/>
+      </p:ext>
+    </p:extLst>
+  </p:cSld>
+  <p:clrMapOvr>
+    <a:masterClrMapping/>
+  </p:clrMapOvr>
+  <p:timing>
+    <p:tnLst>
+      <p:par>
+        <p:cTn xmlns:p14="http://schemas.microsoft.com/office/powerpoint/2010/main" id="1" dur="indefinite" restart="never" nodeType="tmRoot"/>
+      </p:par>
+    </p:tnLst>
+  </p:timing>
+</p:sld>
+</file>
+
+<file path=ppt/slides/slide12.xml><?xml version="1.0" encoding="utf-8"?>
+<p:sld xmlns:a="http://schemas.openxmlformats.org/drawingml/2006/main" xmlns:r="http://schemas.openxmlformats.org/officeDocument/2006/relationships" xmlns:p="http://schemas.openxmlformats.org/presentationml/2006/main">
+  <p:cSld>
+    <p:spTree>
+      <p:nvGrpSpPr>
+        <p:cNvPr id="1" name=""/>
+        <p:cNvGrpSpPr/>
+        <p:nvPr/>
+      </p:nvGrpSpPr>
+      <p:grpSpPr>
+        <a:xfrm>
+          <a:off x="0" y="0"/>
+          <a:ext cx="0" cy="0"/>
+          <a:chOff x="0" y="0"/>
+          <a:chExt cx="0" cy="0"/>
+        </a:xfrm>
+      </p:grpSpPr>
+      <p:sp>
+        <p:nvSpPr>
+          <p:cNvPr id="2" name="Title 1"/>
+          <p:cNvSpPr>
+            <a:spLocks noGrp="1"/>
+          </p:cNvSpPr>
+          <p:nvPr>
+            <p:ph type="title"/>
+          </p:nvPr>
+        </p:nvSpPr>
+        <p:spPr/>
+        <p:txBody>
+          <a:bodyPr>
+            <a:normAutofit fontScale="90000"/>
+          </a:bodyPr>
+          <a:lstStyle/>
+          <a:p>
+            <a:pPr algn="l"/>
+            <a:r>
+              <a:rPr lang="en-US" dirty="0" smtClean="0"/>
+              <a:t>Static Analysis</a:t>
+            </a:r>
+            <a:br>
+              <a:rPr lang="en-US" dirty="0" smtClean="0"/>
+            </a:br>
+            <a:r>
+              <a:rPr lang="en-US" sz="2700" dirty="0" smtClean="0"/>
+              <a:t>Blacklisting Sequential Code</a:t>
+            </a:r>
+            <a:endParaRPr lang="en-US" sz="2700" dirty="0"/>
+          </a:p>
+        </p:txBody>
+      </p:sp>
+      <p:sp>
+        <p:nvSpPr>
+          <p:cNvPr id="11" name="Content Placeholder 15"/>
+          <p:cNvSpPr>
+            <a:spLocks noGrp="1"/>
+          </p:cNvSpPr>
+          <p:nvPr>
+            <p:ph idx="1"/>
+          </p:nvPr>
+        </p:nvSpPr>
+        <p:spPr>
+          <a:xfrm>
+            <a:off x="457200" y="1608151"/>
+            <a:ext cx="8229600" cy="2579941"/>
+          </a:xfrm>
+        </p:spPr>
+        <p:txBody>
+          <a:bodyPr>
+            <a:noAutofit/>
+          </a:bodyPr>
+          <a:lstStyle/>
+          <a:p>
+            <a:r>
+              <a:rPr lang="en-US" sz="2800" dirty="0" err="1" smtClean="0"/>
+              <a:t>OpenMP’s</a:t>
+            </a:r>
+            <a:r>
+              <a:rPr lang="en-US" sz="2800" dirty="0" smtClean="0"/>
+              <a:t> structured fork-join parallelism</a:t>
+            </a:r>
+          </a:p>
+          <a:p>
+            <a:pPr lvl="1"/>
+            <a:r>
+              <a:rPr lang="en-US" sz="2400" dirty="0" smtClean="0">
+                <a:effectLst/>
+              </a:rPr>
+              <a:t>Guarantee finding sequential instructions</a:t>
+            </a:r>
+          </a:p>
+          <a:p>
+            <a:pPr lvl="1"/>
+            <a:r>
+              <a:rPr lang="en-US" sz="2400" dirty="0" smtClean="0">
+                <a:effectLst/>
+              </a:rPr>
+              <a:t>Every instruction outside a OpenMP construct is executed by the master thread</a:t>
+            </a:r>
+          </a:p>
+          <a:p>
+            <a:pPr lvl="1"/>
+            <a:r>
+              <a:rPr lang="en-US" sz="2400" dirty="0" smtClean="0"/>
+              <a:t>Master thread take part of the parallel team</a:t>
+            </a:r>
+            <a:endParaRPr lang="en-US" sz="2400" dirty="0">
+              <a:effectLst/>
+            </a:endParaRPr>
+          </a:p>
+        </p:txBody>
+      </p:sp>
+      <p:pic>
+        <p:nvPicPr>
+          <p:cNvPr id="5" name="Picture 4" descr="nested_parallelism.pdf"/>
+          <p:cNvPicPr>
+            <a:picLocks noChangeAspect="1"/>
+          </p:cNvPicPr>
+          <p:nvPr/>
+        </p:nvPicPr>
+        <p:blipFill>
+          <a:blip r:embed="rId2">
+            <a:extLst>
+              <a:ext uri="{28A0092B-C50C-407E-A947-70E740481C1C}">
+                <a14:useLocalDpi xmlns:a14="http://schemas.microsoft.com/office/drawing/2010/main" val="0"/>
+              </a:ext>
+            </a:extLst>
+          </a:blip>
+          <a:stretch>
+            <a:fillRect/>
+          </a:stretch>
+        </p:blipFill>
+        <p:spPr>
+          <a:xfrm>
+            <a:off x="457200" y="4145431"/>
+            <a:ext cx="8229600" cy="2233225"/>
+          </a:xfrm>
+          <a:prstGeom prst="rect">
+            <a:avLst/>
+          </a:prstGeom>
+        </p:spPr>
+      </p:pic>
+    </p:spTree>
+    <p:extLst>
+      <p:ext uri="{BB962C8B-B14F-4D97-AF65-F5344CB8AC3E}">
+        <p14:creationId xmlns:p14="http://schemas.microsoft.com/office/powerpoint/2010/main" val="3550153920"/>
+      </p:ext>
+    </p:extLst>
+  </p:cSld>
+  <p:clrMapOvr>
+    <a:masterClrMapping/>
+  </p:clrMapOvr>
+  <p:timing>
+    <p:tnLst>
+      <p:par>
+        <p:cTn xmlns:p14="http://schemas.microsoft.com/office/powerpoint/2010/main" id="1" dur="indefinite" restart="never" nodeType="tmRoot"/>
+      </p:par>
+    </p:tnLst>
+  </p:timing>
+</p:sld>
+</file>
+
+<file path=ppt/slides/slide13.xml><?xml version="1.0" encoding="utf-8"?>
+<p:sld xmlns:a="http://schemas.openxmlformats.org/drawingml/2006/main" xmlns:r="http://schemas.openxmlformats.org/officeDocument/2006/relationships" xmlns:p="http://schemas.openxmlformats.org/presentationml/2006/main">
+  <p:cSld>
+    <p:spTree>
+      <p:nvGrpSpPr>
+        <p:cNvPr id="1" name=""/>
+        <p:cNvGrpSpPr/>
+        <p:nvPr/>
+      </p:nvGrpSpPr>
+      <p:grpSpPr>
+        <a:xfrm>
+          <a:off x="0" y="0"/>
+          <a:ext cx="0" cy="0"/>
+          <a:chOff x="0" y="0"/>
+          <a:chExt cx="0" cy="0"/>
+        </a:xfrm>
+      </p:grpSpPr>
+      <p:sp>
+        <p:nvSpPr>
+          <p:cNvPr id="10" name="Rectangle 9"/>
+          <p:cNvSpPr/>
+          <p:nvPr/>
+        </p:nvSpPr>
+        <p:spPr>
+          <a:xfrm>
+            <a:off x="457200" y="3419669"/>
+            <a:ext cx="4022467" cy="1200329"/>
+          </a:xfrm>
+          <a:prstGeom prst="rect">
+            <a:avLst/>
+          </a:prstGeom>
+          <a:solidFill>
+            <a:srgbClr val="00FF00">
+              <a:alpha val="40000"/>
+            </a:srgbClr>
+          </a:solidFill>
+          <a:ln>
+            <a:noFill/>
+          </a:ln>
+          <a:effectLst/>
+        </p:spPr>
+        <p:style>
+          <a:lnRef idx="1">
+            <a:schemeClr val="accent1"/>
+          </a:lnRef>
+          <a:fillRef idx="3">
+            <a:schemeClr val="accent1"/>
+          </a:fillRef>
+          <a:effectRef idx="2">
+            <a:schemeClr val="accent1"/>
+          </a:effectRef>
+          <a:fontRef idx="minor">
+            <a:schemeClr val="lt1"/>
+          </a:fontRef>
+        </p:style>
+        <p:txBody>
+          <a:bodyPr rtlCol="0" anchor="ctr"/>
+          <a:lstStyle/>
+          <a:p>
+            <a:pPr algn="ctr"/>
+            <a:endParaRPr lang="en-US"/>
+          </a:p>
+        </p:txBody>
+      </p:sp>
+      <p:sp>
+        <p:nvSpPr>
+          <p:cNvPr id="4" name="TextBox 3"/>
+          <p:cNvSpPr txBox="1"/>
+          <p:nvPr/>
+        </p:nvSpPr>
+        <p:spPr>
+          <a:xfrm>
+            <a:off x="457200" y="3419669"/>
+            <a:ext cx="4063282" cy="1200329"/>
+          </a:xfrm>
+          <a:prstGeom prst="rect">
+            <a:avLst/>
+          </a:prstGeom>
+          <a:noFill/>
+          <a:ln>
+            <a:noFill/>
+          </a:ln>
+        </p:spPr>
+        <p:txBody>
+          <a:bodyPr wrap="none" rtlCol="0">
+            <a:spAutoFit/>
+          </a:bodyPr>
+          <a:lstStyle/>
+          <a:p>
+            <a:r>
+              <a:rPr lang="en-US" b="1" dirty="0" smtClean="0">
+                <a:solidFill>
+                  <a:srgbClr val="0000FF"/>
+                </a:solidFill>
+                <a:latin typeface="Andale Mono"/>
+                <a:cs typeface="Andale Mono"/>
+              </a:rPr>
+              <a:t>#pragma </a:t>
+            </a:r>
+            <a:r>
+              <a:rPr lang="en-US" b="1" dirty="0" err="1" smtClean="0">
+                <a:solidFill>
+                  <a:srgbClr val="0000FF"/>
+                </a:solidFill>
+                <a:latin typeface="Andale Mono"/>
+                <a:cs typeface="Andale Mono"/>
+              </a:rPr>
+              <a:t>omp</a:t>
+            </a:r>
+            <a:r>
+              <a:rPr lang="en-US" b="1" dirty="0" smtClean="0">
+                <a:solidFill>
+                  <a:srgbClr val="0000FF"/>
+                </a:solidFill>
+                <a:latin typeface="Andale Mono"/>
+                <a:cs typeface="Andale Mono"/>
+              </a:rPr>
+              <a:t> parallel for</a:t>
+            </a:r>
+          </a:p>
+          <a:p>
+            <a:r>
+              <a:rPr lang="en-US" dirty="0" smtClean="0">
+                <a:latin typeface="Andale Mono"/>
+                <a:cs typeface="Andale Mono"/>
+              </a:rPr>
+              <a:t>for(</a:t>
+            </a:r>
+            <a:r>
+              <a:rPr lang="en-US" dirty="0" err="1" smtClean="0">
+                <a:latin typeface="Andale Mono"/>
+                <a:cs typeface="Andale Mono"/>
+              </a:rPr>
+              <a:t>int</a:t>
+            </a:r>
+            <a:r>
+              <a:rPr lang="en-US" dirty="0" smtClean="0">
+                <a:latin typeface="Andale Mono"/>
+                <a:cs typeface="Andale Mono"/>
+              </a:rPr>
+              <a:t> </a:t>
+            </a:r>
+            <a:r>
+              <a:rPr lang="en-US" dirty="0" err="1" smtClean="0">
+                <a:latin typeface="Andale Mono"/>
+                <a:cs typeface="Andale Mono"/>
+              </a:rPr>
+              <a:t>i</a:t>
+            </a:r>
+            <a:r>
+              <a:rPr lang="en-US" dirty="0" smtClean="0">
+                <a:latin typeface="Andale Mono"/>
+                <a:cs typeface="Andale Mono"/>
+              </a:rPr>
+              <a:t> = 0; </a:t>
+            </a:r>
+            <a:r>
+              <a:rPr lang="en-US" dirty="0" err="1" smtClean="0">
+                <a:latin typeface="Andale Mono"/>
+                <a:cs typeface="Andale Mono"/>
+              </a:rPr>
+              <a:t>i</a:t>
+            </a:r>
+            <a:r>
+              <a:rPr lang="en-US" dirty="0" smtClean="0">
+                <a:latin typeface="Andale Mono"/>
+                <a:cs typeface="Andale Mono"/>
+              </a:rPr>
+              <a:t> &lt; N; </a:t>
+            </a:r>
+            <a:r>
+              <a:rPr lang="en-US" dirty="0" err="1" smtClean="0">
+                <a:latin typeface="Andale Mono"/>
+                <a:cs typeface="Andale Mono"/>
+              </a:rPr>
+              <a:t>i</a:t>
+            </a:r>
+            <a:r>
+              <a:rPr lang="en-US" dirty="0" smtClean="0">
+                <a:latin typeface="Andale Mono"/>
+                <a:cs typeface="Andale Mono"/>
+              </a:rPr>
+              <a:t>++) {</a:t>
+            </a:r>
+          </a:p>
+          <a:p>
+            <a:r>
+              <a:rPr lang="en-US" dirty="0">
+                <a:latin typeface="Andale Mono"/>
+                <a:cs typeface="Andale Mono"/>
+              </a:rPr>
+              <a:t> </a:t>
+            </a:r>
+            <a:r>
+              <a:rPr lang="en-US" dirty="0" smtClean="0">
+                <a:latin typeface="Andale Mono"/>
+                <a:cs typeface="Andale Mono"/>
+              </a:rPr>
+              <a:t>  a[</a:t>
+            </a:r>
+            <a:r>
+              <a:rPr lang="en-US" dirty="0" err="1" smtClean="0">
+                <a:latin typeface="Andale Mono"/>
+                <a:cs typeface="Andale Mono"/>
+              </a:rPr>
+              <a:t>i</a:t>
+            </a:r>
+            <a:r>
+              <a:rPr lang="en-US" dirty="0" smtClean="0">
+                <a:latin typeface="Andale Mono"/>
+                <a:cs typeface="Andale Mono"/>
+              </a:rPr>
+              <a:t>] = a[</a:t>
+            </a:r>
+            <a:r>
+              <a:rPr lang="en-US" dirty="0" err="1" smtClean="0">
+                <a:latin typeface="Andale Mono"/>
+                <a:cs typeface="Andale Mono"/>
+              </a:rPr>
+              <a:t>i</a:t>
+            </a:r>
+            <a:r>
+              <a:rPr lang="en-US" dirty="0" smtClean="0">
+                <a:latin typeface="Andale Mono"/>
+                <a:cs typeface="Andale Mono"/>
+              </a:rPr>
+              <a:t>] + 1;</a:t>
+            </a:r>
+          </a:p>
+          <a:p>
+            <a:r>
+              <a:rPr lang="en-US" dirty="0">
+                <a:latin typeface="Andale Mono"/>
+                <a:cs typeface="Andale Mono"/>
+              </a:rPr>
+              <a:t>}</a:t>
+            </a:r>
+          </a:p>
+        </p:txBody>
+      </p:sp>
+      <p:sp>
+        <p:nvSpPr>
+          <p:cNvPr id="13" name="Rectangle 12"/>
+          <p:cNvSpPr/>
+          <p:nvPr/>
+        </p:nvSpPr>
+        <p:spPr>
+          <a:xfrm>
+            <a:off x="457200" y="4936660"/>
+            <a:ext cx="4022467" cy="1200329"/>
+          </a:xfrm>
+          <a:prstGeom prst="rect">
+            <a:avLst/>
+          </a:prstGeom>
+          <a:solidFill>
+            <a:srgbClr val="FF0000">
+              <a:alpha val="40000"/>
+            </a:srgbClr>
+          </a:solidFill>
+          <a:ln>
+            <a:noFill/>
+          </a:ln>
+          <a:effectLst/>
+        </p:spPr>
+        <p:style>
+          <a:lnRef idx="1">
+            <a:schemeClr val="accent1"/>
+          </a:lnRef>
+          <a:fillRef idx="3">
+            <a:schemeClr val="accent1"/>
+          </a:fillRef>
+          <a:effectRef idx="2">
+            <a:schemeClr val="accent1"/>
+          </a:effectRef>
+          <a:fontRef idx="minor">
+            <a:schemeClr val="lt1"/>
+          </a:fontRef>
+        </p:style>
+        <p:txBody>
+          <a:bodyPr rtlCol="0" anchor="ctr"/>
+          <a:lstStyle/>
+          <a:p>
+            <a:pPr algn="ctr"/>
+            <a:endParaRPr lang="en-US"/>
+          </a:p>
+        </p:txBody>
+      </p:sp>
+      <p:sp>
+        <p:nvSpPr>
+          <p:cNvPr id="7" name="TextBox 6"/>
+          <p:cNvSpPr txBox="1"/>
+          <p:nvPr/>
+        </p:nvSpPr>
+        <p:spPr>
+          <a:xfrm>
+            <a:off x="457200" y="4936660"/>
+            <a:ext cx="4022467" cy="1200329"/>
+          </a:xfrm>
+          <a:prstGeom prst="rect">
+            <a:avLst/>
+          </a:prstGeom>
+          <a:noFill/>
+        </p:spPr>
+        <p:txBody>
+          <a:bodyPr wrap="square" rtlCol="0">
+            <a:spAutoFit/>
+          </a:bodyPr>
+          <a:lstStyle/>
+          <a:p>
+            <a:r>
+              <a:rPr lang="en-US" b="1" dirty="0" smtClean="0">
+                <a:solidFill>
+                  <a:srgbClr val="0000FF"/>
+                </a:solidFill>
+                <a:latin typeface="Andale Mono"/>
+                <a:cs typeface="Andale Mono"/>
+              </a:rPr>
+              <a:t>#pragma </a:t>
+            </a:r>
+            <a:r>
+              <a:rPr lang="en-US" b="1" dirty="0" err="1" smtClean="0">
+                <a:solidFill>
+                  <a:srgbClr val="0000FF"/>
+                </a:solidFill>
+                <a:latin typeface="Andale Mono"/>
+                <a:cs typeface="Andale Mono"/>
+              </a:rPr>
+              <a:t>omp</a:t>
+            </a:r>
+            <a:r>
+              <a:rPr lang="en-US" b="1" dirty="0" smtClean="0">
+                <a:solidFill>
+                  <a:srgbClr val="0000FF"/>
+                </a:solidFill>
+                <a:latin typeface="Andale Mono"/>
+                <a:cs typeface="Andale Mono"/>
+              </a:rPr>
+              <a:t> parallel for</a:t>
+            </a:r>
+          </a:p>
+          <a:p>
+            <a:r>
+              <a:rPr lang="en-US" dirty="0" smtClean="0">
+                <a:latin typeface="Andale Mono"/>
+                <a:cs typeface="Andale Mono"/>
+              </a:rPr>
+              <a:t>for(</a:t>
+            </a:r>
+            <a:r>
+              <a:rPr lang="en-US" dirty="0" err="1" smtClean="0">
+                <a:latin typeface="Andale Mono"/>
+                <a:cs typeface="Andale Mono"/>
+              </a:rPr>
+              <a:t>int</a:t>
+            </a:r>
+            <a:r>
+              <a:rPr lang="en-US" dirty="0" smtClean="0">
+                <a:latin typeface="Andale Mono"/>
+                <a:cs typeface="Andale Mono"/>
+              </a:rPr>
+              <a:t> </a:t>
+            </a:r>
+            <a:r>
+              <a:rPr lang="en-US" dirty="0" err="1" smtClean="0">
+                <a:latin typeface="Andale Mono"/>
+                <a:cs typeface="Andale Mono"/>
+              </a:rPr>
+              <a:t>i</a:t>
+            </a:r>
+            <a:r>
+              <a:rPr lang="en-US" dirty="0" smtClean="0">
+                <a:latin typeface="Andale Mono"/>
+                <a:cs typeface="Andale Mono"/>
+              </a:rPr>
+              <a:t> = 1; </a:t>
+            </a:r>
+            <a:r>
+              <a:rPr lang="en-US" dirty="0" err="1" smtClean="0">
+                <a:latin typeface="Andale Mono"/>
+                <a:cs typeface="Andale Mono"/>
+              </a:rPr>
+              <a:t>i</a:t>
+            </a:r>
+            <a:r>
+              <a:rPr lang="en-US" dirty="0" smtClean="0">
+                <a:latin typeface="Andale Mono"/>
+                <a:cs typeface="Andale Mono"/>
+              </a:rPr>
+              <a:t> &lt; N; </a:t>
+            </a:r>
+            <a:r>
+              <a:rPr lang="en-US" dirty="0" err="1" smtClean="0">
+                <a:latin typeface="Andale Mono"/>
+                <a:cs typeface="Andale Mono"/>
+              </a:rPr>
+              <a:t>i</a:t>
+            </a:r>
+            <a:r>
+              <a:rPr lang="en-US" dirty="0" smtClean="0">
+                <a:latin typeface="Andale Mono"/>
+                <a:cs typeface="Andale Mono"/>
+              </a:rPr>
+              <a:t>++) {</a:t>
+            </a:r>
+          </a:p>
+          <a:p>
+            <a:r>
+              <a:rPr lang="en-US" dirty="0">
+                <a:latin typeface="Andale Mono"/>
+                <a:cs typeface="Andale Mono"/>
+              </a:rPr>
+              <a:t> </a:t>
+            </a:r>
+            <a:r>
+              <a:rPr lang="en-US" dirty="0" smtClean="0">
+                <a:latin typeface="Andale Mono"/>
+                <a:cs typeface="Andale Mono"/>
+              </a:rPr>
+              <a:t>  a[</a:t>
+            </a:r>
+            <a:r>
+              <a:rPr lang="en-US" dirty="0" err="1" smtClean="0">
+                <a:latin typeface="Andale Mono"/>
+                <a:cs typeface="Andale Mono"/>
+              </a:rPr>
+              <a:t>i</a:t>
+            </a:r>
+            <a:r>
+              <a:rPr lang="en-US" dirty="0" smtClean="0">
+                <a:latin typeface="Andale Mono"/>
+                <a:cs typeface="Andale Mono"/>
+              </a:rPr>
+              <a:t>] = a[</a:t>
+            </a:r>
+            <a:r>
+              <a:rPr lang="en-US" dirty="0" err="1" smtClean="0">
+                <a:latin typeface="Andale Mono"/>
+                <a:cs typeface="Andale Mono"/>
+              </a:rPr>
+              <a:t>i</a:t>
+            </a:r>
+            <a:r>
+              <a:rPr lang="en-US" dirty="0" smtClean="0">
+                <a:latin typeface="Andale Mono"/>
+                <a:cs typeface="Andale Mono"/>
+              </a:rPr>
+              <a:t> - 1];</a:t>
+            </a:r>
+          </a:p>
+          <a:p>
+            <a:r>
+              <a:rPr lang="en-US" dirty="0">
+                <a:latin typeface="Andale Mono"/>
+                <a:cs typeface="Andale Mono"/>
+              </a:rPr>
+              <a:t>}</a:t>
+            </a:r>
+          </a:p>
+        </p:txBody>
+      </p:sp>
+      <p:sp>
+        <p:nvSpPr>
+          <p:cNvPr id="2" name="Title 1"/>
+          <p:cNvSpPr>
+            <a:spLocks noGrp="1"/>
+          </p:cNvSpPr>
+          <p:nvPr>
+            <p:ph type="title"/>
+          </p:nvPr>
+        </p:nvSpPr>
+        <p:spPr/>
+        <p:txBody>
+          <a:bodyPr>
+            <a:normAutofit fontScale="90000"/>
+          </a:bodyPr>
+          <a:lstStyle/>
+          <a:p>
+            <a:pPr algn="l"/>
+            <a:r>
+              <a:rPr lang="en-US" dirty="0" smtClean="0"/>
+              <a:t>Static Analysis</a:t>
+            </a:r>
+            <a:br>
+              <a:rPr lang="en-US" dirty="0" smtClean="0"/>
+            </a:br>
+            <a:r>
+              <a:rPr lang="en-US" sz="2700" dirty="0" smtClean="0"/>
+              <a:t>Data Dependency Analysis</a:t>
+            </a:r>
+            <a:endParaRPr lang="en-US" sz="2700" dirty="0"/>
+          </a:p>
+        </p:txBody>
+      </p:sp>
+      <p:sp>
+        <p:nvSpPr>
+          <p:cNvPr id="11" name="Content Placeholder 15"/>
+          <p:cNvSpPr>
+            <a:spLocks noGrp="1"/>
+          </p:cNvSpPr>
+          <p:nvPr>
+            <p:ph idx="1"/>
+          </p:nvPr>
+        </p:nvSpPr>
+        <p:spPr>
+          <a:xfrm>
+            <a:off x="457200" y="1608151"/>
+            <a:ext cx="8229600" cy="1539673"/>
+          </a:xfrm>
+        </p:spPr>
+        <p:txBody>
+          <a:bodyPr>
+            <a:noAutofit/>
+          </a:bodyPr>
+          <a:lstStyle/>
+          <a:p>
+            <a:r>
+              <a:rPr lang="en-US" sz="2800" dirty="0"/>
+              <a:t>Loop-carried data dependency </a:t>
+            </a:r>
+            <a:r>
+              <a:rPr lang="en-US" sz="2800" dirty="0" smtClean="0"/>
+              <a:t>analysis:</a:t>
+            </a:r>
+          </a:p>
+          <a:p>
+            <a:pPr lvl="1"/>
+            <a:r>
+              <a:rPr lang="en-US" sz="2400" dirty="0" smtClean="0"/>
+              <a:t>Parallel </a:t>
+            </a:r>
+            <a:r>
+              <a:rPr lang="en-US" sz="2400" dirty="0"/>
+              <a:t>for-loops with no dependencies are race </a:t>
+            </a:r>
+            <a:r>
+              <a:rPr lang="en-US" sz="2400" dirty="0" smtClean="0"/>
+              <a:t>free</a:t>
+            </a:r>
+          </a:p>
+          <a:p>
+            <a:pPr lvl="1"/>
+            <a:r>
+              <a:rPr lang="en-US" sz="2400" dirty="0" smtClean="0"/>
+              <a:t>Blacklisting these regions from runtime analysis</a:t>
+            </a:r>
+            <a:endParaRPr lang="en-US" sz="2400" dirty="0">
+              <a:effectLst/>
+            </a:endParaRPr>
+          </a:p>
+        </p:txBody>
+      </p:sp>
+      <p:sp>
+        <p:nvSpPr>
+          <p:cNvPr id="3" name="Rectangle 2"/>
+          <p:cNvSpPr/>
+          <p:nvPr/>
+        </p:nvSpPr>
+        <p:spPr>
+          <a:xfrm>
+            <a:off x="4479667" y="3290501"/>
+            <a:ext cx="184666" cy="276999"/>
+          </a:xfrm>
+          <a:prstGeom prst="rect">
+            <a:avLst/>
+          </a:prstGeom>
+        </p:spPr>
+        <p:txBody>
+          <a:bodyPr wrap="none">
+            <a:spAutoFit/>
+          </a:bodyPr>
+          <a:lstStyle/>
+          <a:p>
+            <a:r>
+              <a:rPr lang="en-US" baseline="30000" dirty="0"/>
+              <a:t> </a:t>
+            </a:r>
+            <a:endParaRPr lang="en-US" dirty="0"/>
+          </a:p>
+        </p:txBody>
+      </p:sp>
+      <p:sp>
+        <p:nvSpPr>
+          <p:cNvPr id="6" name="Right Brace 5"/>
+          <p:cNvSpPr/>
+          <p:nvPr/>
+        </p:nvSpPr>
+        <p:spPr>
+          <a:xfrm>
+            <a:off x="4563835" y="3419669"/>
+            <a:ext cx="256721" cy="1200329"/>
+          </a:xfrm>
+          <a:prstGeom prst="rightBrace">
+            <a:avLst/>
+          </a:prstGeom>
+          <a:ln>
+            <a:solidFill>
+              <a:schemeClr val="tx1"/>
+            </a:solidFill>
+          </a:ln>
+          <a:effectLst/>
+        </p:spPr>
+        <p:style>
+          <a:lnRef idx="2">
+            <a:schemeClr val="accent1"/>
+          </a:lnRef>
+          <a:fillRef idx="0">
+            <a:schemeClr val="accent1"/>
+          </a:fillRef>
+          <a:effectRef idx="1">
+            <a:schemeClr val="accent1"/>
+          </a:effectRef>
+          <a:fontRef idx="minor">
+            <a:schemeClr val="tx1"/>
+          </a:fontRef>
+        </p:style>
+        <p:txBody>
+          <a:bodyPr rtlCol="0" anchor="ctr"/>
+          <a:lstStyle/>
+          <a:p>
+            <a:pPr algn="ctr"/>
+            <a:endParaRPr lang="en-US"/>
+          </a:p>
+        </p:txBody>
+      </p:sp>
+      <p:sp>
+        <p:nvSpPr>
+          <p:cNvPr id="9" name="Right Brace 8"/>
+          <p:cNvSpPr/>
+          <p:nvPr/>
+        </p:nvSpPr>
+        <p:spPr>
+          <a:xfrm>
+            <a:off x="4563835" y="4936660"/>
+            <a:ext cx="256721" cy="1200329"/>
+          </a:xfrm>
+          <a:prstGeom prst="rightBrace">
+            <a:avLst/>
+          </a:prstGeom>
+          <a:ln>
+            <a:solidFill>
+              <a:schemeClr val="tx1"/>
+            </a:solidFill>
+          </a:ln>
+          <a:effectLst/>
+        </p:spPr>
+        <p:style>
+          <a:lnRef idx="2">
+            <a:schemeClr val="accent1"/>
+          </a:lnRef>
+          <a:fillRef idx="0">
+            <a:schemeClr val="accent1"/>
+          </a:fillRef>
+          <a:effectRef idx="1">
+            <a:schemeClr val="accent1"/>
+          </a:effectRef>
+          <a:fontRef idx="minor">
+            <a:schemeClr val="tx1"/>
+          </a:fontRef>
+        </p:style>
+        <p:txBody>
+          <a:bodyPr rtlCol="0" anchor="ctr"/>
+          <a:lstStyle/>
+          <a:p>
+            <a:pPr algn="ctr"/>
+            <a:endParaRPr lang="en-US"/>
+          </a:p>
+        </p:txBody>
+      </p:sp>
+      <p:sp>
+        <p:nvSpPr>
+          <p:cNvPr id="8" name="TextBox 7"/>
+          <p:cNvSpPr txBox="1"/>
+          <p:nvPr/>
+        </p:nvSpPr>
+        <p:spPr>
+          <a:xfrm>
+            <a:off x="5201980" y="3689089"/>
+            <a:ext cx="3484820" cy="646331"/>
+          </a:xfrm>
+          <a:prstGeom prst="rect">
+            <a:avLst/>
+          </a:prstGeom>
+          <a:noFill/>
+        </p:spPr>
+        <p:txBody>
+          <a:bodyPr wrap="square" rtlCol="0">
+            <a:spAutoFit/>
+          </a:bodyPr>
+          <a:lstStyle/>
+          <a:p>
+            <a:r>
+              <a:rPr lang="en-US" dirty="0" smtClean="0"/>
+              <a:t>No data dependency, code can be excluded from runtime analysis</a:t>
+            </a:r>
+            <a:endParaRPr lang="en-US" dirty="0"/>
+          </a:p>
+        </p:txBody>
+      </p:sp>
+      <p:sp>
+        <p:nvSpPr>
+          <p:cNvPr id="12" name="TextBox 11"/>
+          <p:cNvSpPr txBox="1"/>
+          <p:nvPr/>
+        </p:nvSpPr>
+        <p:spPr>
+          <a:xfrm>
+            <a:off x="5201980" y="5070897"/>
+            <a:ext cx="3484820" cy="923330"/>
+          </a:xfrm>
+          <a:prstGeom prst="rect">
+            <a:avLst/>
+          </a:prstGeom>
+          <a:noFill/>
+        </p:spPr>
+        <p:txBody>
+          <a:bodyPr wrap="square" rtlCol="0">
+            <a:spAutoFit/>
+          </a:bodyPr>
+          <a:lstStyle/>
+          <a:p>
+            <a:r>
+              <a:rPr lang="en-US" dirty="0" smtClean="0"/>
+              <a:t>Data dependency on array access, potentially race therefore checked at runtime</a:t>
+            </a:r>
+            <a:endParaRPr lang="en-US" dirty="0"/>
+          </a:p>
+        </p:txBody>
+      </p:sp>
+    </p:spTree>
+    <p:extLst>
+      <p:ext uri="{BB962C8B-B14F-4D97-AF65-F5344CB8AC3E}">
+        <p14:creationId xmlns:p14="http://schemas.microsoft.com/office/powerpoint/2010/main" val="1249774231"/>
+      </p:ext>
+    </p:extLst>
+  </p:cSld>
+  <p:clrMapOvr>
+    <a:masterClrMapping/>
+  </p:clrMapOvr>
+  <p:timing>
+    <p:tnLst>
+      <p:par>
+        <p:cTn xmlns:p14="http://schemas.microsoft.com/office/powerpoint/2010/main" id="1" dur="indefinite" restart="never" nodeType="tmRoot"/>
+      </p:par>
+    </p:tnLst>
+  </p:timing>
+</p:sld>
+</file>
+
+<file path=ppt/slides/slide14.xml><?xml version="1.0" encoding="utf-8"?>
+<p:sld xmlns:a="http://schemas.openxmlformats.org/drawingml/2006/main" xmlns:r="http://schemas.openxmlformats.org/officeDocument/2006/relationships" xmlns:p="http://schemas.openxmlformats.org/presentationml/2006/main">
+  <p:cSld>
+    <p:spTree>
+      <p:nvGrpSpPr>
+        <p:cNvPr id="1" name=""/>
+        <p:cNvGrpSpPr/>
+        <p:nvPr/>
+      </p:nvGrpSpPr>
+      <p:grpSpPr>
+        <a:xfrm>
+          <a:off x="0" y="0"/>
+          <a:ext cx="0" cy="0"/>
+          <a:chOff x="0" y="0"/>
+          <a:chExt cx="0" cy="0"/>
+        </a:xfrm>
+      </p:grpSpPr>
+      <p:sp>
+        <p:nvSpPr>
+          <p:cNvPr id="2" name="Title 1"/>
+          <p:cNvSpPr>
+            <a:spLocks noGrp="1"/>
+          </p:cNvSpPr>
+          <p:nvPr>
+            <p:ph type="title"/>
+          </p:nvPr>
+        </p:nvSpPr>
+        <p:spPr/>
+        <p:txBody>
+          <a:bodyPr>
+            <a:normAutofit fontScale="90000"/>
+          </a:bodyPr>
+          <a:lstStyle/>
+          <a:p>
+            <a:pPr algn="l"/>
+            <a:r>
+              <a:rPr lang="en-US" dirty="0" smtClean="0"/>
+              <a:t>Archer v1</a:t>
+            </a:r>
+            <a:br>
+              <a:rPr lang="en-US" dirty="0" smtClean="0"/>
+            </a:br>
+            <a:r>
+              <a:rPr lang="en-US" sz="2700" dirty="0" smtClean="0"/>
+              <a:t>Combining Static and Dynamic Analysis</a:t>
+            </a:r>
+            <a:endParaRPr lang="en-US" sz="2700" dirty="0"/>
+          </a:p>
+        </p:txBody>
+      </p:sp>
+      <p:pic>
+        <p:nvPicPr>
+          <p:cNvPr id="17" name="Picture 16" descr="archerdiagram.pdf"/>
+          <p:cNvPicPr>
+            <a:picLocks noChangeAspect="1"/>
+          </p:cNvPicPr>
+          <p:nvPr/>
+        </p:nvPicPr>
+        <p:blipFill>
+          <a:blip r:embed="rId3">
+            <a:extLst>
+              <a:ext uri="{28A0092B-C50C-407E-A947-70E740481C1C}">
+                <a14:useLocalDpi xmlns:a14="http://schemas.microsoft.com/office/drawing/2010/main" val="0"/>
+              </a:ext>
+            </a:extLst>
+          </a:blip>
+          <a:stretch>
+            <a:fillRect/>
+          </a:stretch>
+        </p:blipFill>
+        <p:spPr>
+          <a:xfrm>
+            <a:off x="457200" y="1611310"/>
+            <a:ext cx="8229600" cy="2307885"/>
+          </a:xfrm>
+          <a:prstGeom prst="rect">
+            <a:avLst/>
+          </a:prstGeom>
+        </p:spPr>
+      </p:pic>
+      <p:sp>
+        <p:nvSpPr>
+          <p:cNvPr id="19" name="Content Placeholder 15"/>
+          <p:cNvSpPr>
+            <a:spLocks noGrp="1"/>
+          </p:cNvSpPr>
+          <p:nvPr>
+            <p:ph idx="1"/>
+          </p:nvPr>
+        </p:nvSpPr>
+        <p:spPr>
+          <a:xfrm>
+            <a:off x="457200" y="3919195"/>
+            <a:ext cx="8229600" cy="2579102"/>
+          </a:xfrm>
+        </p:spPr>
+        <p:txBody>
+          <a:bodyPr>
+            <a:noAutofit/>
+          </a:bodyPr>
+          <a:lstStyle/>
+          <a:p>
+            <a:r>
+              <a:rPr lang="en-US" sz="2400" dirty="0" smtClean="0">
+                <a:effectLst/>
+              </a:rPr>
+              <a:t>LLVM/Clang based tool</a:t>
+            </a:r>
+          </a:p>
+          <a:p>
+            <a:r>
+              <a:rPr lang="en-US" sz="2400" dirty="0" err="1" smtClean="0"/>
+              <a:t>TSan</a:t>
+            </a:r>
+            <a:r>
+              <a:rPr lang="en-US" sz="2400" dirty="0" smtClean="0"/>
+              <a:t> data race runtime analysis</a:t>
+            </a:r>
+          </a:p>
+          <a:p>
+            <a:r>
+              <a:rPr lang="en-US" sz="2400" dirty="0" smtClean="0"/>
+              <a:t>Instrumented OpenMP runtime</a:t>
+            </a:r>
+          </a:p>
+          <a:p>
+            <a:pPr lvl="1"/>
+            <a:r>
+              <a:rPr lang="en-US" sz="2000" dirty="0" smtClean="0">
+                <a:effectLst/>
+              </a:rPr>
+              <a:t>Annotations mechanism to communicate </a:t>
+            </a:r>
+            <a:r>
+              <a:rPr lang="en-US" sz="2000" dirty="0" err="1" smtClean="0">
+                <a:effectLst/>
+              </a:rPr>
+              <a:t>TSan</a:t>
+            </a:r>
+            <a:r>
+              <a:rPr lang="en-US" sz="2000" dirty="0" smtClean="0">
+                <a:effectLst/>
+              </a:rPr>
+              <a:t> runtime about happens-before relations between threads</a:t>
+            </a:r>
+          </a:p>
+          <a:p>
+            <a:pPr lvl="1"/>
+            <a:r>
+              <a:rPr lang="en-US" sz="2000" dirty="0" smtClean="0"/>
+              <a:t>Unknown synchronization mechanism (i.e. barriers, </a:t>
+            </a:r>
+            <a:r>
+              <a:rPr lang="en-US" sz="2000" dirty="0" err="1" smtClean="0"/>
+              <a:t>criticals</a:t>
+            </a:r>
+            <a:r>
+              <a:rPr lang="en-US" sz="2000" dirty="0" smtClean="0"/>
+              <a:t>, etc</a:t>
+            </a:r>
+            <a:r>
+              <a:rPr lang="en-US" sz="2000" dirty="0"/>
+              <a:t>.</a:t>
+            </a:r>
+            <a:r>
+              <a:rPr lang="en-US" sz="2000" dirty="0" smtClean="0"/>
+              <a:t>)</a:t>
+            </a:r>
+            <a:endParaRPr lang="en-US" sz="2000" dirty="0">
+              <a:effectLst/>
+            </a:endParaRPr>
+          </a:p>
+        </p:txBody>
+      </p:sp>
+    </p:spTree>
+    <p:extLst>
+      <p:ext uri="{BB962C8B-B14F-4D97-AF65-F5344CB8AC3E}">
+        <p14:creationId xmlns:p14="http://schemas.microsoft.com/office/powerpoint/2010/main" val="3598220810"/>
+      </p:ext>
+    </p:extLst>
+  </p:cSld>
+  <p:clrMapOvr>
+    <a:masterClrMapping/>
+  </p:clrMapOvr>
+  <p:timing>
+    <p:tnLst>
+      <p:par>
+        <p:cTn xmlns:p14="http://schemas.microsoft.com/office/powerpoint/2010/main" id="1" dur="indefinite" restart="never" nodeType="tmRoot"/>
+      </p:par>
+    </p:tnLst>
+  </p:timing>
+</p:sld>
+</file>
+
+<file path=ppt/slides/slide15.xml><?xml version="1.0" encoding="utf-8"?>
+<p:sld xmlns:a="http://schemas.openxmlformats.org/drawingml/2006/main" xmlns:r="http://schemas.openxmlformats.org/officeDocument/2006/relationships" xmlns:p="http://schemas.openxmlformats.org/presentationml/2006/main">
+  <p:cSld>
+    <p:spTree>
+      <p:nvGrpSpPr>
+        <p:cNvPr id="1" name=""/>
+        <p:cNvGrpSpPr/>
+        <p:nvPr/>
+      </p:nvGrpSpPr>
+      <p:grpSpPr>
+        <a:xfrm>
+          <a:off x="0" y="0"/>
+          <a:ext cx="0" cy="0"/>
+          <a:chOff x="0" y="0"/>
+          <a:chExt cx="0" cy="0"/>
+        </a:xfrm>
+      </p:grpSpPr>
+      <p:sp>
+        <p:nvSpPr>
+          <p:cNvPr id="2" name="Title 1"/>
+          <p:cNvSpPr>
+            <a:spLocks noGrp="1"/>
+          </p:cNvSpPr>
+          <p:nvPr>
+            <p:ph type="title"/>
+          </p:nvPr>
+        </p:nvSpPr>
+        <p:spPr/>
+        <p:txBody>
+          <a:bodyPr>
+            <a:normAutofit fontScale="90000"/>
+          </a:bodyPr>
+          <a:lstStyle/>
+          <a:p>
+            <a:pPr algn="l"/>
+            <a:r>
+              <a:rPr lang="en-US" dirty="0" smtClean="0">
+                <a:solidFill>
+                  <a:prstClr val="black"/>
+                </a:solidFill>
+              </a:rPr>
+              <a:t>Timeline</a:t>
+            </a:r>
+            <a:br>
+              <a:rPr lang="en-US" dirty="0" smtClean="0">
+                <a:solidFill>
+                  <a:prstClr val="black"/>
+                </a:solidFill>
+              </a:rPr>
+            </a:br>
+            <a:r>
+              <a:rPr lang="en-US" sz="2700" dirty="0" smtClean="0">
+                <a:solidFill>
+                  <a:prstClr val="black"/>
+                </a:solidFill>
+              </a:rPr>
+              <a:t>Past and future publications</a:t>
+            </a:r>
+            <a:endParaRPr lang="en-US" dirty="0"/>
+          </a:p>
+        </p:txBody>
+      </p:sp>
+      <p:sp>
+        <p:nvSpPr>
+          <p:cNvPr id="3" name="Content Placeholder 2"/>
+          <p:cNvSpPr>
+            <a:spLocks noGrp="1"/>
+          </p:cNvSpPr>
+          <p:nvPr>
+            <p:ph idx="1"/>
+          </p:nvPr>
+        </p:nvSpPr>
+        <p:spPr/>
+        <p:txBody>
+          <a:bodyPr>
+            <a:normAutofit/>
+          </a:bodyPr>
+          <a:lstStyle/>
+          <a:p>
+            <a:r>
+              <a:rPr lang="en-US" sz="3000" dirty="0" smtClean="0"/>
+              <a:t>Feasibility of combining static and dynamic analysis for OpenMP data race detection    [LLVM-HPC WS/SC’14]</a:t>
+            </a:r>
+          </a:p>
+          <a:p>
+            <a:r>
+              <a:rPr lang="en-US" sz="3000" dirty="0" smtClean="0"/>
+              <a:t>Archer v1 – static analysis and </a:t>
+            </a:r>
+            <a:r>
+              <a:rPr lang="en-US" sz="3000" dirty="0" err="1" smtClean="0"/>
+              <a:t>TSan</a:t>
+            </a:r>
+            <a:r>
+              <a:rPr lang="en-US" sz="3000" dirty="0" smtClean="0"/>
+              <a:t> runtime [IPDPS’16]</a:t>
+            </a:r>
+          </a:p>
+          <a:p>
+            <a:r>
+              <a:rPr lang="en-US" sz="3000" dirty="0" smtClean="0"/>
+              <a:t>Clock-less runtime algorithm [POPL’17, PPoPP’17]</a:t>
+            </a:r>
+          </a:p>
+          <a:p>
+            <a:r>
+              <a:rPr lang="en-US" sz="3000" dirty="0" smtClean="0"/>
+              <a:t>Archer v2 – static </a:t>
+            </a:r>
+            <a:r>
+              <a:rPr lang="en-US" sz="3000" dirty="0"/>
+              <a:t>analysis and clock-less runtime algorithm [PLDI’17, IPDPS’17]</a:t>
+            </a:r>
+          </a:p>
+          <a:p>
+            <a:endParaRPr lang="en-US" sz="3000" dirty="0"/>
+          </a:p>
+        </p:txBody>
+      </p:sp>
+    </p:spTree>
+    <p:extLst>
+      <p:ext uri="{BB962C8B-B14F-4D97-AF65-F5344CB8AC3E}">
+        <p14:creationId xmlns:p14="http://schemas.microsoft.com/office/powerpoint/2010/main" val="2982352226"/>
+      </p:ext>
+    </p:extLst>
+  </p:cSld>
+  <p:clrMapOvr>
+    <a:masterClrMapping/>
+  </p:clrMapOvr>
+  <p:timing>
+    <p:tnLst>
+      <p:par>
+        <p:cTn xmlns:p14="http://schemas.microsoft.com/office/powerpoint/2010/main" id="1" dur="indefinite" restart="never" nodeType="tmRoot"/>
+      </p:par>
+    </p:tnLst>
+  </p:timing>
+</p:sld>
+</file>
+
+<file path=ppt/slides/slide16.xml><?xml version="1.0" encoding="utf-8"?>
+<p:sld xmlns:a="http://schemas.openxmlformats.org/drawingml/2006/main" xmlns:r="http://schemas.openxmlformats.org/officeDocument/2006/relationships" xmlns:p="http://schemas.openxmlformats.org/presentationml/2006/main">
+  <p:cSld>
+    <p:spTree>
+      <p:nvGrpSpPr>
+        <p:cNvPr id="1" name=""/>
+        <p:cNvGrpSpPr/>
+        <p:nvPr/>
+      </p:nvGrpSpPr>
+      <p:grpSpPr>
+        <a:xfrm>
+          <a:off x="0" y="0"/>
+          <a:ext cx="0" cy="0"/>
+          <a:chOff x="0" y="0"/>
+          <a:chExt cx="0" cy="0"/>
+        </a:xfrm>
+      </p:grpSpPr>
+      <p:sp>
+        <p:nvSpPr>
+          <p:cNvPr id="2" name="Title 1"/>
+          <p:cNvSpPr>
+            <a:spLocks noGrp="1"/>
+          </p:cNvSpPr>
+          <p:nvPr>
+            <p:ph type="title"/>
+          </p:nvPr>
+        </p:nvSpPr>
+        <p:spPr/>
+        <p:txBody>
+          <a:bodyPr>
+            <a:normAutofit/>
+          </a:bodyPr>
+          <a:lstStyle/>
+          <a:p>
+            <a:pPr algn="l"/>
+            <a:endParaRPr lang="en-US" dirty="0"/>
+          </a:p>
+        </p:txBody>
+      </p:sp>
+      <p:sp>
+        <p:nvSpPr>
+          <p:cNvPr id="3" name="Content Placeholder 2"/>
+          <p:cNvSpPr>
+            <a:spLocks noGrp="1"/>
+          </p:cNvSpPr>
+          <p:nvPr>
+            <p:ph idx="1"/>
+          </p:nvPr>
+        </p:nvSpPr>
+        <p:spPr/>
+        <p:txBody>
+          <a:bodyPr>
+            <a:normAutofit/>
+          </a:bodyPr>
+          <a:lstStyle/>
+          <a:p>
+            <a:pPr marL="0" indent="0" algn="ctr">
+              <a:buNone/>
+            </a:pPr>
+            <a:endParaRPr lang="en-US" sz="4400" dirty="0" smtClean="0">
+              <a:solidFill>
+                <a:prstClr val="black"/>
+              </a:solidFill>
+            </a:endParaRPr>
+          </a:p>
+          <a:p>
+            <a:pPr marL="0" indent="0" algn="ctr">
+              <a:buNone/>
+            </a:pPr>
+            <a:endParaRPr lang="en-US" sz="4400" dirty="0" smtClean="0">
+              <a:solidFill>
+                <a:prstClr val="black"/>
+              </a:solidFill>
+            </a:endParaRPr>
+          </a:p>
+          <a:p>
+            <a:pPr marL="0" indent="0" algn="ctr">
+              <a:buNone/>
+            </a:pPr>
+            <a:r>
+              <a:rPr lang="en-US" sz="4400" dirty="0" smtClean="0">
+                <a:solidFill>
+                  <a:prstClr val="black"/>
+                </a:solidFill>
+              </a:rPr>
+              <a:t>Questions</a:t>
+            </a:r>
+            <a:r>
+              <a:rPr lang="en-US" sz="4400" dirty="0">
+                <a:solidFill>
+                  <a:prstClr val="black"/>
+                </a:solidFill>
+              </a:rPr>
+              <a:t>?</a:t>
+            </a:r>
+            <a:endParaRPr lang="en-US" sz="4400" dirty="0"/>
+          </a:p>
+        </p:txBody>
+      </p:sp>
+      <p:sp>
+        <p:nvSpPr>
+          <p:cNvPr id="4" name="TextBox 3"/>
+          <p:cNvSpPr txBox="1"/>
+          <p:nvPr/>
+        </p:nvSpPr>
+        <p:spPr>
+          <a:xfrm>
+            <a:off x="2837444" y="2593915"/>
+            <a:ext cx="184666" cy="369332"/>
+          </a:xfrm>
+          <a:prstGeom prst="rect">
+            <a:avLst/>
+          </a:prstGeom>
+          <a:noFill/>
+        </p:spPr>
+        <p:txBody>
+          <a:bodyPr wrap="none" rtlCol="0">
+            <a:spAutoFit/>
+          </a:bodyPr>
+          <a:lstStyle/>
+          <a:p>
+            <a:endParaRPr lang="en-US" dirty="0"/>
+          </a:p>
+        </p:txBody>
+      </p:sp>
+    </p:spTree>
+    <p:extLst>
+      <p:ext uri="{BB962C8B-B14F-4D97-AF65-F5344CB8AC3E}">
+        <p14:creationId xmlns:p14="http://schemas.microsoft.com/office/powerpoint/2010/main" val="2048434548"/>
       </p:ext>
     </p:extLst>
   </p:cSld>
@@ -4231,163 +5977,199 @@
               <a:rPr lang="en-US" dirty="0" smtClean="0"/>
               <a:t>Motivation</a:t>
             </a:r>
+            <a:r>
+              <a:rPr lang="en-US" dirty="0" smtClean="0"/>
+              <a:t/>
+            </a:r>
             <a:br>
               <a:rPr lang="en-US" dirty="0" smtClean="0"/>
             </a:br>
             <a:r>
-              <a:rPr lang="en-US" sz="2400" dirty="0">
-                <a:latin typeface="Corbel"/>
-                <a:cs typeface="Corbel"/>
-              </a:rPr>
-              <a:t>Architectural trends make HPC debugging </a:t>
-            </a:r>
-            <a:r>
               <a:rPr lang="en-US" sz="2400" dirty="0" smtClean="0">
                 <a:latin typeface="Corbel"/>
                 <a:cs typeface="Corbel"/>
               </a:rPr>
-              <a:t>a </a:t>
-            </a:r>
-            <a:r>
-              <a:rPr lang="en-US" sz="2400" dirty="0">
-                <a:latin typeface="Corbel"/>
-                <a:cs typeface="Corbel"/>
-              </a:rPr>
-              <a:t>greater </a:t>
-            </a:r>
-            <a:r>
-              <a:rPr lang="en-US" sz="2400" dirty="0" smtClean="0">
-                <a:latin typeface="Corbel"/>
-                <a:cs typeface="Corbel"/>
-              </a:rPr>
-              <a:t>challenge</a:t>
+              <a:t>Increased adoption of on-node parallelism in HPC</a:t>
             </a:r>
             <a:endParaRPr lang="en-US" dirty="0"/>
           </a:p>
         </p:txBody>
       </p:sp>
-      <p:sp>
-        <p:nvSpPr>
-          <p:cNvPr id="11" name="Content Placeholder 15"/>
-          <p:cNvSpPr>
-            <a:spLocks noGrp="1"/>
-          </p:cNvSpPr>
-          <p:nvPr>
-            <p:ph idx="1"/>
-          </p:nvPr>
-        </p:nvSpPr>
+      <p:pic>
+        <p:nvPicPr>
+          <p:cNvPr id="5" name="Picture 4" descr="sequoia.jpg"/>
+          <p:cNvPicPr>
+            <a:picLocks noChangeAspect="1"/>
+          </p:cNvPicPr>
+          <p:nvPr/>
+        </p:nvPicPr>
+        <p:blipFill>
+          <a:blip r:embed="rId2">
+            <a:extLst>
+              <a:ext uri="{28A0092B-C50C-407E-A947-70E740481C1C}">
+                <a14:useLocalDpi xmlns:a14="http://schemas.microsoft.com/office/drawing/2010/main" val="0"/>
+              </a:ext>
+            </a:extLst>
+          </a:blip>
+          <a:stretch>
+            <a:fillRect/>
+          </a:stretch>
+        </p:blipFill>
         <p:spPr>
           <a:xfrm>
-            <a:off x="457200" y="2013450"/>
-            <a:ext cx="8229600" cy="3809348"/>
+            <a:off x="457200" y="4472981"/>
+            <a:ext cx="2980898" cy="2101533"/>
           </a:xfrm>
+          <a:prstGeom prst="rect">
+            <a:avLst/>
+          </a:prstGeom>
         </p:spPr>
-        <p:txBody>
-          <a:bodyPr>
-            <a:noAutofit/>
+      </p:pic>
+      <p:pic>
+        <p:nvPicPr>
+          <p:cNvPr id="6" name="Picture 5"/>
+          <p:cNvPicPr>
+            <a:picLocks noChangeAspect="1"/>
+          </p:cNvPicPr>
+          <p:nvPr/>
+        </p:nvPicPr>
+        <p:blipFill>
+          <a:blip r:embed="rId3">
+            <a:extLst>
+              <a:ext uri="{28A0092B-C50C-407E-A947-70E740481C1C}">
+                <a14:useLocalDpi xmlns:a14="http://schemas.microsoft.com/office/drawing/2010/main" val="0"/>
+              </a:ext>
+            </a:extLst>
+          </a:blip>
+          <a:stretch>
+            <a:fillRect/>
+          </a:stretch>
+        </p:blipFill>
+        <p:spPr>
+          <a:xfrm>
+            <a:off x="5079720" y="1541125"/>
+            <a:ext cx="3607080" cy="2095690"/>
+          </a:xfrm>
+          <a:prstGeom prst="rect">
+            <a:avLst/>
+          </a:prstGeom>
+        </p:spPr>
+      </p:pic>
+      <p:sp>
+        <p:nvSpPr>
+          <p:cNvPr id="7" name="TextBox 6"/>
+          <p:cNvSpPr txBox="1"/>
+          <p:nvPr/>
+        </p:nvSpPr>
+        <p:spPr>
+          <a:xfrm>
+            <a:off x="3438098" y="5166867"/>
+            <a:ext cx="5248702" cy="830997"/>
+          </a:xfrm>
+          <a:prstGeom prst="rect">
+            <a:avLst/>
+          </a:prstGeom>
+          <a:noFill/>
+        </p:spPr>
+        <p:txBody>
+          <a:bodyPr wrap="square" rtlCol="0">
+            <a:spAutoFit/>
           </a:bodyPr>
           <a:lstStyle/>
           <a:p>
-            <a:r>
-              <a:rPr lang="en-US" sz="2400" dirty="0">
-                <a:latin typeface="Corbel" panose="020B0503020204020204" pitchFamily="34" charset="0"/>
-              </a:rPr>
-              <a:t>Amounts of concurrency grow exponentially</a:t>
-            </a:r>
-          </a:p>
-          <a:p>
-            <a:pPr lvl="1"/>
-            <a:r>
-              <a:rPr lang="en-US" sz="2000" dirty="0">
-                <a:latin typeface="Corbel" panose="020B0503020204020204" pitchFamily="34" charset="0"/>
-              </a:rPr>
-              <a:t>Make </a:t>
-            </a:r>
-            <a:r>
-              <a:rPr lang="en-US" sz="2000" i="1" dirty="0">
-                <a:latin typeface="Corbel" panose="020B0503020204020204" pitchFamily="34" charset="0"/>
-              </a:rPr>
-              <a:t>at-scale </a:t>
-            </a:r>
-            <a:r>
-              <a:rPr lang="en-US" sz="2000" dirty="0">
-                <a:latin typeface="Corbel" panose="020B0503020204020204" pitchFamily="34" charset="0"/>
-              </a:rPr>
-              <a:t>bugs commonplace</a:t>
-            </a:r>
-          </a:p>
-          <a:p>
-            <a:r>
-              <a:rPr lang="en-US" sz="2400" dirty="0">
-                <a:latin typeface="Corbel" panose="020B0503020204020204" pitchFamily="34" charset="0"/>
-              </a:rPr>
-              <a:t>Explosion of on-node parallelism options</a:t>
-            </a:r>
-          </a:p>
-          <a:p>
-            <a:pPr lvl="1"/>
-            <a:r>
-              <a:rPr lang="en-US" sz="2000" dirty="0">
-                <a:latin typeface="Corbel" panose="020B0503020204020204" pitchFamily="34" charset="0"/>
-              </a:rPr>
-              <a:t>More cores, wider SMT and SIMD units, accelerators (GPUs) …</a:t>
-            </a:r>
-          </a:p>
-          <a:p>
-            <a:pPr lvl="1"/>
-            <a:r>
-              <a:rPr lang="en-US" sz="2000" dirty="0">
-                <a:latin typeface="Corbel" panose="020B0503020204020204" pitchFamily="34" charset="0"/>
-              </a:rPr>
-              <a:t>Bring applications to a crossroad for hybrid parallelism: MPI + X</a:t>
-            </a:r>
-          </a:p>
-          <a:p>
-            <a:pPr lvl="1"/>
-            <a:r>
-              <a:rPr lang="en-US" sz="2000" dirty="0">
-                <a:latin typeface="Corbel" panose="020B0503020204020204" pitchFamily="34" charset="0"/>
-              </a:rPr>
-              <a:t>More sources of non-determinism: </a:t>
-            </a:r>
-            <a:r>
-              <a:rPr lang="en-US" sz="2000" dirty="0" smtClean="0">
-                <a:latin typeface="Corbel" panose="020B0503020204020204" pitchFamily="34" charset="0"/>
-              </a:rPr>
-              <a:t>OpenMP </a:t>
-            </a:r>
-            <a:r>
-              <a:rPr lang="en-US" sz="2000" dirty="0">
-                <a:latin typeface="Corbel" panose="020B0503020204020204" pitchFamily="34" charset="0"/>
-              </a:rPr>
-              <a:t>data races</a:t>
-            </a:r>
-          </a:p>
-          <a:p>
-            <a:r>
-              <a:rPr lang="en-US" sz="2400" dirty="0">
-                <a:latin typeface="Corbel"/>
-                <a:cs typeface="Corbel"/>
-              </a:rPr>
-              <a:t>Need more capable and scalable tools</a:t>
-            </a:r>
-          </a:p>
-          <a:p>
-            <a:pPr lvl="1"/>
-            <a:r>
-              <a:rPr lang="en-US" sz="2000" dirty="0">
-                <a:latin typeface="Corbel"/>
-                <a:cs typeface="Corbel"/>
-              </a:rPr>
-              <a:t>General strategy – bring best capabilities and compose them </a:t>
-            </a:r>
+            <a:pPr algn="ctr"/>
+            <a:r>
+              <a:rPr lang="en-US" sz="2400" b="1" dirty="0" smtClean="0"/>
+              <a:t>Sequoia</a:t>
+            </a:r>
+          </a:p>
+          <a:p>
+            <a:pPr algn="ctr"/>
+            <a:r>
+              <a:rPr lang="en-US" sz="2400" b="1" dirty="0" smtClean="0"/>
+              <a:t>17 PFLOPS</a:t>
+            </a:r>
+            <a:endParaRPr lang="en-US" sz="2400" b="1" dirty="0"/>
+          </a:p>
+        </p:txBody>
+      </p:sp>
+      <p:sp>
+        <p:nvSpPr>
+          <p:cNvPr id="8" name="TextBox 7"/>
+          <p:cNvSpPr txBox="1"/>
+          <p:nvPr/>
+        </p:nvSpPr>
+        <p:spPr>
+          <a:xfrm>
+            <a:off x="457200" y="2176405"/>
+            <a:ext cx="4622520" cy="830997"/>
+          </a:xfrm>
+          <a:prstGeom prst="rect">
+            <a:avLst/>
+          </a:prstGeom>
+          <a:noFill/>
+        </p:spPr>
+        <p:txBody>
+          <a:bodyPr wrap="square" rtlCol="0">
+            <a:spAutoFit/>
+          </a:bodyPr>
+          <a:lstStyle/>
+          <a:p>
+            <a:pPr algn="ctr"/>
+            <a:r>
+              <a:rPr lang="en-US" sz="2400" b="1" dirty="0" smtClean="0"/>
+              <a:t>Tianhe-2</a:t>
+            </a:r>
+          </a:p>
+          <a:p>
+            <a:pPr algn="ctr"/>
+            <a:r>
+              <a:rPr lang="en-US" sz="2400" b="1" dirty="0" smtClean="0"/>
+              <a:t>33 PFLOPS</a:t>
+            </a:r>
+            <a:endParaRPr lang="en-US" sz="2400" b="1" dirty="0"/>
+          </a:p>
+        </p:txBody>
+      </p:sp>
+      <p:sp>
+        <p:nvSpPr>
+          <p:cNvPr id="9" name="TextBox 8"/>
+          <p:cNvSpPr txBox="1"/>
+          <p:nvPr/>
+        </p:nvSpPr>
+        <p:spPr>
+          <a:xfrm>
+            <a:off x="457200" y="3636815"/>
+            <a:ext cx="8229600" cy="707886"/>
+          </a:xfrm>
+          <a:prstGeom prst="rect">
+            <a:avLst/>
+          </a:prstGeom>
+          <a:noFill/>
+        </p:spPr>
+        <p:txBody>
+          <a:bodyPr wrap="square" rtlCol="0">
+            <a:spAutoFit/>
+          </a:bodyPr>
+          <a:lstStyle/>
+          <a:p>
+            <a:pPr algn="ctr"/>
+            <a:r>
+              <a:rPr lang="en-US" sz="4000" b="1" dirty="0" err="1" smtClean="0"/>
+              <a:t>Peta</a:t>
+            </a:r>
+            <a:r>
+              <a:rPr lang="en-US" sz="4000" b="1" dirty="0" smtClean="0"/>
+              <a:t>-Scale Machines</a:t>
+            </a:r>
+            <a:endParaRPr lang="en-US" sz="4000" b="1" dirty="0"/>
           </a:p>
         </p:txBody>
       </p:sp>
     </p:spTree>
     <p:extLst>
       <p:ext uri="{BB962C8B-B14F-4D97-AF65-F5344CB8AC3E}">
-        <p14:creationId xmlns:p14="http://schemas.microsoft.com/office/powerpoint/2010/main" val="1984526690"/>
+        <p14:creationId xmlns:p14="http://schemas.microsoft.com/office/powerpoint/2010/main" val="3743296242"/>
       </p:ext>
     </p:extLst>
   </p:cSld>
@@ -4427,6 +6209,270 @@
         <p:spPr/>
         <p:txBody>
           <a:bodyPr>
+            <a:normAutofit/>
+          </a:bodyPr>
+          <a:lstStyle/>
+          <a:p>
+            <a:pPr algn="l"/>
+            <a:r>
+              <a:rPr lang="en-US" dirty="0" smtClean="0"/>
+              <a:t>Motivation</a:t>
+            </a:r>
+            <a:br>
+              <a:rPr lang="en-US" dirty="0" smtClean="0"/>
+            </a:br>
+            <a:r>
+              <a:rPr lang="en-US" sz="2400" dirty="0">
+                <a:latin typeface="Corbel"/>
+                <a:cs typeface="Corbel"/>
+              </a:rPr>
+              <a:t>Architectural trends make HPC debugging </a:t>
+            </a:r>
+            <a:r>
+              <a:rPr lang="en-US" sz="2400" dirty="0" smtClean="0">
+                <a:latin typeface="Corbel"/>
+                <a:cs typeface="Corbel"/>
+              </a:rPr>
+              <a:t>a </a:t>
+            </a:r>
+            <a:r>
+              <a:rPr lang="en-US" sz="2400" dirty="0">
+                <a:latin typeface="Corbel"/>
+                <a:cs typeface="Corbel"/>
+              </a:rPr>
+              <a:t>greater </a:t>
+            </a:r>
+            <a:r>
+              <a:rPr lang="en-US" sz="2400" dirty="0" smtClean="0">
+                <a:latin typeface="Corbel"/>
+                <a:cs typeface="Corbel"/>
+              </a:rPr>
+              <a:t>challenge</a:t>
+            </a:r>
+            <a:endParaRPr lang="en-US" dirty="0"/>
+          </a:p>
+        </p:txBody>
+      </p:sp>
+      <p:sp>
+        <p:nvSpPr>
+          <p:cNvPr id="11" name="Content Placeholder 15"/>
+          <p:cNvSpPr>
+            <a:spLocks noGrp="1"/>
+          </p:cNvSpPr>
+          <p:nvPr>
+            <p:ph idx="1"/>
+          </p:nvPr>
+        </p:nvSpPr>
+        <p:spPr>
+          <a:xfrm>
+            <a:off x="457200" y="2013450"/>
+            <a:ext cx="8229600" cy="3809348"/>
+          </a:xfrm>
+        </p:spPr>
+        <p:txBody>
+          <a:bodyPr>
+            <a:noAutofit/>
+          </a:bodyPr>
+          <a:lstStyle/>
+          <a:p>
+            <a:r>
+              <a:rPr lang="en-US" sz="2800" dirty="0">
+                <a:latin typeface="Corbel" panose="020B0503020204020204" pitchFamily="34" charset="0"/>
+              </a:rPr>
+              <a:t>Amounts of concurrency grow exponentially</a:t>
+            </a:r>
+          </a:p>
+          <a:p>
+            <a:r>
+              <a:rPr lang="en-US" sz="2800" dirty="0" smtClean="0">
+                <a:latin typeface="Corbel" panose="020B0503020204020204" pitchFamily="34" charset="0"/>
+              </a:rPr>
+              <a:t>Explosion </a:t>
+            </a:r>
+            <a:r>
+              <a:rPr lang="en-US" sz="2800" dirty="0">
+                <a:latin typeface="Corbel" panose="020B0503020204020204" pitchFamily="34" charset="0"/>
+              </a:rPr>
+              <a:t>of on-node parallelism options</a:t>
+            </a:r>
+          </a:p>
+          <a:p>
+            <a:pPr lvl="1"/>
+            <a:r>
+              <a:rPr lang="en-US" sz="2400" dirty="0">
+                <a:latin typeface="Corbel" panose="020B0503020204020204" pitchFamily="34" charset="0"/>
+              </a:rPr>
+              <a:t>More cores, </a:t>
+            </a:r>
+            <a:r>
+              <a:rPr lang="en-US" sz="2400" dirty="0" smtClean="0">
+                <a:latin typeface="Corbel" panose="020B0503020204020204" pitchFamily="34" charset="0"/>
+              </a:rPr>
+              <a:t>SIMD </a:t>
+            </a:r>
+            <a:r>
+              <a:rPr lang="en-US" sz="2400" dirty="0">
+                <a:latin typeface="Corbel" panose="020B0503020204020204" pitchFamily="34" charset="0"/>
+              </a:rPr>
+              <a:t>units, accelerators (GPUs</a:t>
+            </a:r>
+            <a:r>
+              <a:rPr lang="en-US" sz="2400" dirty="0" smtClean="0">
+                <a:latin typeface="Corbel" panose="020B0503020204020204" pitchFamily="34" charset="0"/>
+              </a:rPr>
+              <a:t>), etc.</a:t>
+            </a:r>
+            <a:endParaRPr lang="en-US" sz="2400" dirty="0">
+              <a:latin typeface="Corbel" panose="020B0503020204020204" pitchFamily="34" charset="0"/>
+            </a:endParaRPr>
+          </a:p>
+          <a:p>
+            <a:pPr lvl="1"/>
+            <a:r>
+              <a:rPr lang="en-US" sz="2400" dirty="0">
+                <a:latin typeface="Corbel" panose="020B0503020204020204" pitchFamily="34" charset="0"/>
+              </a:rPr>
+              <a:t>Bring applications to a crossroad for hybrid </a:t>
+            </a:r>
+            <a:r>
+              <a:rPr lang="en-US" sz="2400" dirty="0" smtClean="0">
+                <a:latin typeface="Corbel" panose="020B0503020204020204" pitchFamily="34" charset="0"/>
+              </a:rPr>
+              <a:t>parallelism</a:t>
+            </a:r>
+            <a:endParaRPr lang="en-US" sz="2400" dirty="0">
+              <a:latin typeface="Corbel" panose="020B0503020204020204" pitchFamily="34" charset="0"/>
+            </a:endParaRPr>
+          </a:p>
+          <a:p>
+            <a:pPr lvl="2"/>
+            <a:r>
+              <a:rPr lang="en-US" sz="2000" dirty="0" smtClean="0">
+                <a:latin typeface="Corbel" panose="020B0503020204020204" pitchFamily="34" charset="0"/>
+              </a:rPr>
+              <a:t>i.e.</a:t>
+            </a:r>
+            <a:r>
+              <a:rPr lang="en-US" sz="2000" dirty="0" smtClean="0">
+                <a:latin typeface="Corbel" panose="020B0503020204020204" pitchFamily="34" charset="0"/>
+              </a:rPr>
+              <a:t> </a:t>
+            </a:r>
+            <a:r>
+              <a:rPr lang="en-US" sz="2000" dirty="0">
+                <a:latin typeface="Corbel" panose="020B0503020204020204" pitchFamily="34" charset="0"/>
+              </a:rPr>
+              <a:t>MPI + </a:t>
+            </a:r>
+            <a:r>
+              <a:rPr lang="en-US" sz="2000" dirty="0" smtClean="0">
+                <a:latin typeface="Corbel" panose="020B0503020204020204" pitchFamily="34" charset="0"/>
+              </a:rPr>
+              <a:t>OpenMP</a:t>
+            </a:r>
+            <a:endParaRPr lang="en-US" sz="2000" dirty="0">
+              <a:latin typeface="Corbel" panose="020B0503020204020204" pitchFamily="34" charset="0"/>
+            </a:endParaRPr>
+          </a:p>
+          <a:p>
+            <a:pPr lvl="1"/>
+            <a:r>
+              <a:rPr lang="en-US" sz="2400" dirty="0">
+                <a:latin typeface="Corbel" panose="020B0503020204020204" pitchFamily="34" charset="0"/>
+              </a:rPr>
+              <a:t>More sources of non-determinism: </a:t>
+            </a:r>
+            <a:r>
+              <a:rPr lang="en-US" sz="2400" dirty="0" smtClean="0">
+                <a:latin typeface="Corbel" panose="020B0503020204020204" pitchFamily="34" charset="0"/>
+              </a:rPr>
+              <a:t>OpenMP </a:t>
+            </a:r>
+            <a:r>
+              <a:rPr lang="en-US" sz="2400" dirty="0">
+                <a:latin typeface="Corbel" panose="020B0503020204020204" pitchFamily="34" charset="0"/>
+              </a:rPr>
+              <a:t>data races</a:t>
+            </a:r>
+          </a:p>
+          <a:p>
+            <a:r>
+              <a:rPr lang="en-US" sz="2800" dirty="0">
+                <a:latin typeface="Corbel"/>
+                <a:cs typeface="Corbel"/>
+              </a:rPr>
+              <a:t>Need more capable and scalable tools</a:t>
+            </a:r>
+          </a:p>
+          <a:p>
+            <a:pPr lvl="1"/>
+            <a:r>
+              <a:rPr lang="en-US" sz="2400" dirty="0">
+                <a:latin typeface="Corbel"/>
+                <a:cs typeface="Corbel"/>
+              </a:rPr>
+              <a:t>General </a:t>
+            </a:r>
+            <a:r>
+              <a:rPr lang="en-US" sz="2400" dirty="0" smtClean="0">
+                <a:latin typeface="Corbel"/>
+                <a:cs typeface="Corbel"/>
+              </a:rPr>
+              <a:t>strategy – bring </a:t>
+            </a:r>
+            <a:r>
+              <a:rPr lang="en-US" sz="2400" dirty="0">
+                <a:latin typeface="Corbel"/>
+                <a:cs typeface="Corbel"/>
+              </a:rPr>
+              <a:t>best capabilities and compose them </a:t>
+            </a:r>
+          </a:p>
+        </p:txBody>
+      </p:sp>
+    </p:spTree>
+    <p:extLst>
+      <p:ext uri="{BB962C8B-B14F-4D97-AF65-F5344CB8AC3E}">
+        <p14:creationId xmlns:p14="http://schemas.microsoft.com/office/powerpoint/2010/main" val="672089550"/>
+      </p:ext>
+    </p:extLst>
+  </p:cSld>
+  <p:clrMapOvr>
+    <a:masterClrMapping/>
+  </p:clrMapOvr>
+</p:sld>
+</file>
+
+<file path=ppt/slides/slide4.xml><?xml version="1.0" encoding="utf-8"?>
+<p:sld xmlns:a="http://schemas.openxmlformats.org/drawingml/2006/main" xmlns:r="http://schemas.openxmlformats.org/officeDocument/2006/relationships" xmlns:p="http://schemas.openxmlformats.org/presentationml/2006/main">
+  <p:cSld>
+    <p:spTree>
+      <p:nvGrpSpPr>
+        <p:cNvPr id="1" name=""/>
+        <p:cNvGrpSpPr/>
+        <p:nvPr/>
+      </p:nvGrpSpPr>
+      <p:grpSpPr>
+        <a:xfrm>
+          <a:off x="0" y="0"/>
+          <a:ext cx="0" cy="0"/>
+          <a:chOff x="0" y="0"/>
+          <a:chExt cx="0" cy="0"/>
+        </a:xfrm>
+      </p:grpSpPr>
+      <p:sp>
+        <p:nvSpPr>
+          <p:cNvPr id="2" name="Title 1"/>
+          <p:cNvSpPr>
+            <a:spLocks noGrp="1"/>
+          </p:cNvSpPr>
+          <p:nvPr>
+            <p:ph type="title"/>
+          </p:nvPr>
+        </p:nvSpPr>
+        <p:spPr/>
+        <p:txBody>
+          <a:bodyPr>
             <a:normAutofit fontScale="90000"/>
           </a:bodyPr>
           <a:lstStyle/>
@@ -4553,10 +6599,6 @@
               </a:rPr>
               <a:t>Suspected data race</a:t>
             </a:r>
-            <a:endParaRPr lang="en-US" sz="2200" dirty="0" smtClean="0">
-              <a:latin typeface="Corbel"/>
-              <a:cs typeface="Corbel"/>
-            </a:endParaRPr>
           </a:p>
           <a:p>
             <a:r>
@@ -4623,7 +6665,7 @@
 </p:sld>
 </file>
 
-<file path=ppt/slides/slide4.xml><?xml version="1.0" encoding="utf-8"?>
+<file path=ppt/slides/slide5.xml><?xml version="1.0" encoding="utf-8"?>
 <p:sld xmlns:a="http://schemas.openxmlformats.org/drawingml/2006/main" xmlns:r="http://schemas.openxmlformats.org/officeDocument/2006/relationships" xmlns:p="http://schemas.openxmlformats.org/presentationml/2006/main">
   <p:cSld>
     <p:spTree>
@@ -4789,184 +6831,6 @@
 </p:sld>
 </file>
 
-<file path=ppt/slides/slide5.xml><?xml version="1.0" encoding="utf-8"?>
-<p:sld xmlns:a="http://schemas.openxmlformats.org/drawingml/2006/main" xmlns:r="http://schemas.openxmlformats.org/officeDocument/2006/relationships" xmlns:p="http://schemas.openxmlformats.org/presentationml/2006/main">
-  <p:cSld>
-    <p:spTree>
-      <p:nvGrpSpPr>
-        <p:cNvPr id="1" name=""/>
-        <p:cNvGrpSpPr/>
-        <p:nvPr/>
-      </p:nvGrpSpPr>
-      <p:grpSpPr>
-        <a:xfrm>
-          <a:off x="0" y="0"/>
-          <a:ext cx="0" cy="0"/>
-          <a:chOff x="0" y="0"/>
-          <a:chExt cx="0" cy="0"/>
-        </a:xfrm>
-      </p:grpSpPr>
-      <p:pic>
-        <p:nvPicPr>
-          <p:cNvPr id="5" name="Picture 4"/>
-          <p:cNvPicPr>
-            <a:picLocks noChangeAspect="1"/>
-          </p:cNvPicPr>
-          <p:nvPr/>
-        </p:nvPicPr>
-        <p:blipFill>
-          <a:blip r:embed="rId2">
-            <a:extLst>
-              <a:ext uri="{28A0092B-C50C-407E-A947-70E740481C1C}">
-                <a14:useLocalDpi xmlns:a14="http://schemas.microsoft.com/office/drawing/2010/main" val="0"/>
-              </a:ext>
-            </a:extLst>
-          </a:blip>
-          <a:stretch>
-            <a:fillRect/>
-          </a:stretch>
-        </p:blipFill>
-        <p:spPr>
-          <a:xfrm>
-            <a:off x="1735134" y="3931402"/>
-            <a:ext cx="5666554" cy="2645905"/>
-          </a:xfrm>
-          <a:prstGeom prst="rect">
-            <a:avLst/>
-          </a:prstGeom>
-        </p:spPr>
-      </p:pic>
-      <p:sp>
-        <p:nvSpPr>
-          <p:cNvPr id="2" name="Title 1"/>
-          <p:cNvSpPr>
-            <a:spLocks noGrp="1"/>
-          </p:cNvSpPr>
-          <p:nvPr>
-            <p:ph type="title"/>
-          </p:nvPr>
-        </p:nvSpPr>
-        <p:spPr/>
-        <p:txBody>
-          <a:bodyPr>
-            <a:normAutofit fontScale="90000"/>
-          </a:bodyPr>
-          <a:lstStyle/>
-          <a:p>
-            <a:pPr algn="l"/>
-            <a:r>
-              <a:rPr lang="en-US" dirty="0" smtClean="0"/>
-              <a:t>Static Analysis</a:t>
-            </a:r>
-            <a:br>
-              <a:rPr lang="en-US" dirty="0" smtClean="0"/>
-            </a:br>
-            <a:r>
-              <a:rPr lang="en-US" sz="2700" dirty="0" smtClean="0"/>
-              <a:t>Blacklisting Sequential Code</a:t>
-            </a:r>
-            <a:endParaRPr lang="en-US" sz="2700" dirty="0"/>
-          </a:p>
-        </p:txBody>
-      </p:sp>
-      <p:sp>
-        <p:nvSpPr>
-          <p:cNvPr id="11" name="Content Placeholder 15"/>
-          <p:cNvSpPr>
-            <a:spLocks noGrp="1"/>
-          </p:cNvSpPr>
-          <p:nvPr>
-            <p:ph idx="1"/>
-          </p:nvPr>
-        </p:nvSpPr>
-        <p:spPr>
-          <a:xfrm>
-            <a:off x="457200" y="1608151"/>
-            <a:ext cx="8229600" cy="2552921"/>
-          </a:xfrm>
-        </p:spPr>
-        <p:txBody>
-          <a:bodyPr>
-            <a:noAutofit/>
-          </a:bodyPr>
-          <a:lstStyle/>
-          <a:p>
-            <a:r>
-              <a:rPr lang="en-US" sz="2800" dirty="0" err="1" smtClean="0"/>
-              <a:t>Pthreads</a:t>
-            </a:r>
-            <a:r>
-              <a:rPr lang="en-US" sz="2800" dirty="0" smtClean="0"/>
-              <a:t> fork-join parallelism</a:t>
-            </a:r>
-          </a:p>
-          <a:p>
-            <a:pPr lvl="1"/>
-            <a:r>
-              <a:rPr lang="en-US" sz="2400" dirty="0" smtClean="0"/>
-              <a:t>Master thread keeps doing its own work while it spawns new threads</a:t>
-            </a:r>
-          </a:p>
-          <a:p>
-            <a:pPr lvl="1"/>
-            <a:r>
-              <a:rPr lang="en-US" sz="2400" dirty="0" smtClean="0"/>
-              <a:t>Hard </a:t>
-            </a:r>
-            <a:r>
-              <a:rPr lang="en-US" sz="2400" dirty="0"/>
-              <a:t>to distinguish sequential from parallel </a:t>
-            </a:r>
-            <a:r>
-              <a:rPr lang="en-US" sz="2400" dirty="0" smtClean="0"/>
-              <a:t>instructions</a:t>
-            </a:r>
-          </a:p>
-          <a:p>
-            <a:pPr lvl="2"/>
-            <a:r>
-              <a:rPr lang="en-US" sz="2000" dirty="0" smtClean="0"/>
-              <a:t>Master thread may </a:t>
-            </a:r>
-            <a:r>
-              <a:rPr lang="en-US" sz="2000" dirty="0"/>
-              <a:t>access shared </a:t>
-            </a:r>
-            <a:r>
-              <a:rPr lang="en-US" sz="2000" dirty="0" smtClean="0"/>
-              <a:t>variables between other threads</a:t>
-            </a:r>
-          </a:p>
-          <a:p>
-            <a:pPr lvl="2"/>
-            <a:r>
-              <a:rPr lang="en-US" sz="2000" dirty="0" smtClean="0"/>
-              <a:t>Some threads may join later</a:t>
-            </a:r>
-            <a:endParaRPr lang="en-US" dirty="0"/>
-          </a:p>
-        </p:txBody>
-      </p:sp>
-    </p:spTree>
-    <p:extLst>
-      <p:ext uri="{BB962C8B-B14F-4D97-AF65-F5344CB8AC3E}">
-        <p14:creationId xmlns:p14="http://schemas.microsoft.com/office/powerpoint/2010/main" val="3259647918"/>
-      </p:ext>
-    </p:extLst>
-  </p:cSld>
-  <p:clrMapOvr>
-    <a:masterClrMapping/>
-  </p:clrMapOvr>
-  <p:timing>
-    <p:tnLst>
-      <p:par>
-        <p:cTn xmlns:p14="http://schemas.microsoft.com/office/powerpoint/2010/main" id="1" dur="indefinite" restart="never" nodeType="tmRoot"/>
-      </p:par>
-    </p:tnLst>
-  </p:timing>
-</p:sld>
-</file>
-
 <file path=ppt/slides/slide6.xml><?xml version="1.0" encoding="utf-8"?>
 <p:sld xmlns:a="http://schemas.openxmlformats.org/drawingml/2006/main" xmlns:r="http://schemas.openxmlformats.org/officeDocument/2006/relationships" xmlns:p="http://schemas.openxmlformats.org/presentationml/2006/main">
   <p:cSld>
@@ -5003,15 +6867,19 @@
           <a:p>
             <a:pPr algn="l"/>
             <a:r>
+              <a:rPr lang="en-US" sz="4900" dirty="0" smtClean="0"/>
+              <a:t>State of the art</a:t>
+            </a:r>
+            <a:r>
               <a:rPr lang="en-US" dirty="0" smtClean="0"/>
-              <a:t>Static Analysis</a:t>
+              <a:t/>
             </a:r>
             <a:br>
               <a:rPr lang="en-US" dirty="0" smtClean="0"/>
             </a:br>
             <a:r>
               <a:rPr lang="en-US" sz="2700" dirty="0" smtClean="0"/>
-              <a:t>Blacklisting Sequential Code</a:t>
+              <a:t>Overview of Data Race Detection Techniques</a:t>
             </a:r>
             <a:endParaRPr lang="en-US" sz="2700" dirty="0"/>
           </a:p>
@@ -5019,7 +6887,7 @@
       </p:sp>
       <p:sp>
         <p:nvSpPr>
-          <p:cNvPr id="11" name="Content Placeholder 15"/>
+          <p:cNvPr id="4" name="Content Placeholder 3"/>
           <p:cNvSpPr>
             <a:spLocks noGrp="1"/>
           </p:cNvSpPr>
@@ -5027,91 +6895,32 @@
             <p:ph idx="1"/>
           </p:nvPr>
         </p:nvSpPr>
-        <p:spPr>
-          <a:xfrm>
-            <a:off x="457200" y="1608151"/>
-            <a:ext cx="8229600" cy="2579941"/>
-          </a:xfrm>
-        </p:spPr>
-        <p:txBody>
-          <a:bodyPr>
-            <a:noAutofit/>
-          </a:bodyPr>
-          <a:lstStyle/>
-          <a:p>
-            <a:r>
-              <a:rPr lang="en-US" sz="2800" dirty="0" err="1" smtClean="0"/>
-              <a:t>OpenMP’s</a:t>
-            </a:r>
-            <a:r>
-              <a:rPr lang="en-US" sz="2800" dirty="0" smtClean="0"/>
-              <a:t> structured fork-join parallelism</a:t>
-            </a:r>
-          </a:p>
-          <a:p>
-            <a:pPr lvl="1"/>
-            <a:r>
-              <a:rPr lang="en-US" sz="2400" dirty="0" smtClean="0">
-                <a:effectLst/>
-              </a:rPr>
-              <a:t>Guarantee finding sequential instructions</a:t>
-            </a:r>
-          </a:p>
-          <a:p>
-            <a:pPr lvl="1"/>
-            <a:r>
-              <a:rPr lang="en-US" sz="2400" dirty="0" smtClean="0">
-                <a:effectLst/>
-              </a:rPr>
-              <a:t>Every instruction outside a OpenMP construct is executed by the master thread</a:t>
-            </a:r>
-          </a:p>
-          <a:p>
-            <a:pPr lvl="1"/>
-            <a:r>
-              <a:rPr lang="en-US" sz="2400" dirty="0" smtClean="0"/>
-              <a:t>Master thread take part of the parallel team</a:t>
-            </a:r>
-            <a:endParaRPr lang="en-US" sz="2400" dirty="0">
-              <a:effectLst/>
-            </a:endParaRPr>
-          </a:p>
-        </p:txBody>
-      </p:sp>
-      <p:pic>
-        <p:nvPicPr>
-          <p:cNvPr id="5" name="Picture 4" descr="nested_parallelism.pdf"/>
-          <p:cNvPicPr>
-            <a:picLocks noChangeAspect="1"/>
-          </p:cNvPicPr>
-          <p:nvPr/>
-        </p:nvPicPr>
-        <p:blipFill>
-          <a:blip r:embed="rId2">
-            <a:extLst>
-              <a:ext uri="{28A0092B-C50C-407E-A947-70E740481C1C}">
-                <a14:useLocalDpi xmlns:a14="http://schemas.microsoft.com/office/drawing/2010/main" val="0"/>
-              </a:ext>
-            </a:extLst>
-          </a:blip>
-          <a:stretch>
-            <a:fillRect/>
-          </a:stretch>
-        </p:blipFill>
-        <p:spPr>
-          <a:xfrm>
-            <a:off x="457200" y="4145431"/>
-            <a:ext cx="8229600" cy="2233225"/>
-          </a:xfrm>
-          <a:prstGeom prst="rect">
-            <a:avLst/>
-          </a:prstGeom>
-        </p:spPr>
-      </p:pic>
+        <p:spPr/>
+        <p:txBody>
+          <a:bodyPr/>
+          <a:lstStyle/>
+          <a:p>
+            <a:endParaRPr lang="en-US" dirty="0" smtClean="0"/>
+          </a:p>
+          <a:p>
+            <a:r>
+              <a:rPr lang="en-US" dirty="0" smtClean="0"/>
+              <a:t>Static analyses</a:t>
+            </a:r>
+          </a:p>
+          <a:p>
+            <a:r>
+              <a:rPr lang="en-US" dirty="0" smtClean="0"/>
+              <a:t>Dynamic analyses</a:t>
+            </a:r>
+            <a:endParaRPr lang="en-US" dirty="0"/>
+          </a:p>
+        </p:txBody>
+      </p:sp>
     </p:spTree>
     <p:extLst>
       <p:ext uri="{BB962C8B-B14F-4D97-AF65-F5344CB8AC3E}">
-        <p14:creationId xmlns:p14="http://schemas.microsoft.com/office/powerpoint/2010/main" val="3550153920"/>
+        <p14:creationId xmlns:p14="http://schemas.microsoft.com/office/powerpoint/2010/main" val="2543987610"/>
       </p:ext>
     </p:extLst>
   </p:cSld>
@@ -5147,449 +6956,6 @@
       </p:grpSpPr>
       <p:sp>
         <p:nvSpPr>
-          <p:cNvPr id="10" name="Rectangle 9"/>
-          <p:cNvSpPr/>
-          <p:nvPr/>
-        </p:nvSpPr>
-        <p:spPr>
-          <a:xfrm>
-            <a:off x="457200" y="3419669"/>
-            <a:ext cx="4022467" cy="1200329"/>
-          </a:xfrm>
-          <a:prstGeom prst="rect">
-            <a:avLst/>
-          </a:prstGeom>
-          <a:solidFill>
-            <a:srgbClr val="00FF00">
-              <a:alpha val="40000"/>
-            </a:srgbClr>
-          </a:solidFill>
-          <a:ln>
-            <a:noFill/>
-          </a:ln>
-          <a:effectLst/>
-        </p:spPr>
-        <p:style>
-          <a:lnRef idx="1">
-            <a:schemeClr val="accent1"/>
-          </a:lnRef>
-          <a:fillRef idx="3">
-            <a:schemeClr val="accent1"/>
-          </a:fillRef>
-          <a:effectRef idx="2">
-            <a:schemeClr val="accent1"/>
-          </a:effectRef>
-          <a:fontRef idx="minor">
-            <a:schemeClr val="lt1"/>
-          </a:fontRef>
-        </p:style>
-        <p:txBody>
-          <a:bodyPr rtlCol="0" anchor="ctr"/>
-          <a:lstStyle/>
-          <a:p>
-            <a:pPr algn="ctr"/>
-            <a:endParaRPr lang="en-US"/>
-          </a:p>
-        </p:txBody>
-      </p:sp>
-      <p:sp>
-        <p:nvSpPr>
-          <p:cNvPr id="4" name="TextBox 3"/>
-          <p:cNvSpPr txBox="1"/>
-          <p:nvPr/>
-        </p:nvSpPr>
-        <p:spPr>
-          <a:xfrm>
-            <a:off x="457200" y="3419669"/>
-            <a:ext cx="4063282" cy="1200329"/>
-          </a:xfrm>
-          <a:prstGeom prst="rect">
-            <a:avLst/>
-          </a:prstGeom>
-          <a:noFill/>
-          <a:ln>
-            <a:noFill/>
-          </a:ln>
-        </p:spPr>
-        <p:txBody>
-          <a:bodyPr wrap="none" rtlCol="0">
-            <a:spAutoFit/>
-          </a:bodyPr>
-          <a:lstStyle/>
-          <a:p>
-            <a:r>
-              <a:rPr lang="en-US" b="1" dirty="0" smtClean="0">
-                <a:solidFill>
-                  <a:srgbClr val="0000FF"/>
-                </a:solidFill>
-                <a:latin typeface="Andale Mono"/>
-                <a:cs typeface="Andale Mono"/>
-              </a:rPr>
-              <a:t>#pragma </a:t>
-            </a:r>
-            <a:r>
-              <a:rPr lang="en-US" b="1" dirty="0" err="1" smtClean="0">
-                <a:solidFill>
-                  <a:srgbClr val="0000FF"/>
-                </a:solidFill>
-                <a:latin typeface="Andale Mono"/>
-                <a:cs typeface="Andale Mono"/>
-              </a:rPr>
-              <a:t>omp</a:t>
-            </a:r>
-            <a:r>
-              <a:rPr lang="en-US" b="1" dirty="0" smtClean="0">
-                <a:solidFill>
-                  <a:srgbClr val="0000FF"/>
-                </a:solidFill>
-                <a:latin typeface="Andale Mono"/>
-                <a:cs typeface="Andale Mono"/>
-              </a:rPr>
-              <a:t> parallel for</a:t>
-            </a:r>
-          </a:p>
-          <a:p>
-            <a:r>
-              <a:rPr lang="en-US" dirty="0" smtClean="0">
-                <a:latin typeface="Andale Mono"/>
-                <a:cs typeface="Andale Mono"/>
-              </a:rPr>
-              <a:t>for(</a:t>
-            </a:r>
-            <a:r>
-              <a:rPr lang="en-US" dirty="0" err="1" smtClean="0">
-                <a:latin typeface="Andale Mono"/>
-                <a:cs typeface="Andale Mono"/>
-              </a:rPr>
-              <a:t>int</a:t>
-            </a:r>
-            <a:r>
-              <a:rPr lang="en-US" dirty="0" smtClean="0">
-                <a:latin typeface="Andale Mono"/>
-                <a:cs typeface="Andale Mono"/>
-              </a:rPr>
-              <a:t> </a:t>
-            </a:r>
-            <a:r>
-              <a:rPr lang="en-US" dirty="0" err="1" smtClean="0">
-                <a:latin typeface="Andale Mono"/>
-                <a:cs typeface="Andale Mono"/>
-              </a:rPr>
-              <a:t>i</a:t>
-            </a:r>
-            <a:r>
-              <a:rPr lang="en-US" dirty="0" smtClean="0">
-                <a:latin typeface="Andale Mono"/>
-                <a:cs typeface="Andale Mono"/>
-              </a:rPr>
-              <a:t> = 0; </a:t>
-            </a:r>
-            <a:r>
-              <a:rPr lang="en-US" dirty="0" err="1" smtClean="0">
-                <a:latin typeface="Andale Mono"/>
-                <a:cs typeface="Andale Mono"/>
-              </a:rPr>
-              <a:t>i</a:t>
-            </a:r>
-            <a:r>
-              <a:rPr lang="en-US" dirty="0" smtClean="0">
-                <a:latin typeface="Andale Mono"/>
-                <a:cs typeface="Andale Mono"/>
-              </a:rPr>
-              <a:t> &lt; N; </a:t>
-            </a:r>
-            <a:r>
-              <a:rPr lang="en-US" dirty="0" err="1" smtClean="0">
-                <a:latin typeface="Andale Mono"/>
-                <a:cs typeface="Andale Mono"/>
-              </a:rPr>
-              <a:t>i</a:t>
-            </a:r>
-            <a:r>
-              <a:rPr lang="en-US" dirty="0" smtClean="0">
-                <a:latin typeface="Andale Mono"/>
-                <a:cs typeface="Andale Mono"/>
-              </a:rPr>
-              <a:t>++) {</a:t>
-            </a:r>
-          </a:p>
-          <a:p>
-            <a:r>
-              <a:rPr lang="en-US" dirty="0">
-                <a:latin typeface="Andale Mono"/>
-                <a:cs typeface="Andale Mono"/>
-              </a:rPr>
-              <a:t> </a:t>
-            </a:r>
-            <a:r>
-              <a:rPr lang="en-US" dirty="0" smtClean="0">
-                <a:latin typeface="Andale Mono"/>
-                <a:cs typeface="Andale Mono"/>
-              </a:rPr>
-              <a:t>  a[</a:t>
-            </a:r>
-            <a:r>
-              <a:rPr lang="en-US" dirty="0" err="1" smtClean="0">
-                <a:latin typeface="Andale Mono"/>
-                <a:cs typeface="Andale Mono"/>
-              </a:rPr>
-              <a:t>i</a:t>
-            </a:r>
-            <a:r>
-              <a:rPr lang="en-US" dirty="0" smtClean="0">
-                <a:latin typeface="Andale Mono"/>
-                <a:cs typeface="Andale Mono"/>
-              </a:rPr>
-              <a:t>] = a[</a:t>
-            </a:r>
-            <a:r>
-              <a:rPr lang="en-US" dirty="0" err="1" smtClean="0">
-                <a:latin typeface="Andale Mono"/>
-                <a:cs typeface="Andale Mono"/>
-              </a:rPr>
-              <a:t>i</a:t>
-            </a:r>
-            <a:r>
-              <a:rPr lang="en-US" dirty="0" smtClean="0">
-                <a:latin typeface="Andale Mono"/>
-                <a:cs typeface="Andale Mono"/>
-              </a:rPr>
-              <a:t>] + 1;</a:t>
-            </a:r>
-          </a:p>
-          <a:p>
-            <a:r>
-              <a:rPr lang="en-US" dirty="0">
-                <a:latin typeface="Andale Mono"/>
-                <a:cs typeface="Andale Mono"/>
-              </a:rPr>
-              <a:t>}</a:t>
-            </a:r>
-          </a:p>
-        </p:txBody>
-      </p:sp>
-      <p:sp>
-        <p:nvSpPr>
-          <p:cNvPr id="13" name="Rectangle 12"/>
-          <p:cNvSpPr/>
-          <p:nvPr/>
-        </p:nvSpPr>
-        <p:spPr>
-          <a:xfrm>
-            <a:off x="457200" y="4936660"/>
-            <a:ext cx="4022467" cy="1200329"/>
-          </a:xfrm>
-          <a:prstGeom prst="rect">
-            <a:avLst/>
-          </a:prstGeom>
-          <a:solidFill>
-            <a:srgbClr val="FF0000">
-              <a:alpha val="40000"/>
-            </a:srgbClr>
-          </a:solidFill>
-          <a:ln>
-            <a:noFill/>
-          </a:ln>
-          <a:effectLst/>
-        </p:spPr>
-        <p:style>
-          <a:lnRef idx="1">
-            <a:schemeClr val="accent1"/>
-          </a:lnRef>
-          <a:fillRef idx="3">
-            <a:schemeClr val="accent1"/>
-          </a:fillRef>
-          <a:effectRef idx="2">
-            <a:schemeClr val="accent1"/>
-          </a:effectRef>
-          <a:fontRef idx="minor">
-            <a:schemeClr val="lt1"/>
-          </a:fontRef>
-        </p:style>
-        <p:txBody>
-          <a:bodyPr rtlCol="0" anchor="ctr"/>
-          <a:lstStyle/>
-          <a:p>
-            <a:pPr algn="ctr"/>
-            <a:endParaRPr lang="en-US"/>
-          </a:p>
-        </p:txBody>
-      </p:sp>
-      <p:sp>
-        <p:nvSpPr>
-          <p:cNvPr id="7" name="TextBox 6"/>
-          <p:cNvSpPr txBox="1"/>
-          <p:nvPr/>
-        </p:nvSpPr>
-        <p:spPr>
-          <a:xfrm>
-            <a:off x="457200" y="4936660"/>
-            <a:ext cx="4022467" cy="1200329"/>
-          </a:xfrm>
-          <a:prstGeom prst="rect">
-            <a:avLst/>
-          </a:prstGeom>
-          <a:noFill/>
-        </p:spPr>
-        <p:txBody>
-          <a:bodyPr wrap="square" rtlCol="0">
-            <a:spAutoFit/>
-          </a:bodyPr>
-          <a:lstStyle/>
-          <a:p>
-            <a:r>
-              <a:rPr lang="en-US" b="1" dirty="0" smtClean="0">
-                <a:solidFill>
-                  <a:srgbClr val="0000FF"/>
-                </a:solidFill>
-                <a:latin typeface="Andale Mono"/>
-                <a:cs typeface="Andale Mono"/>
-              </a:rPr>
-              <a:t>#pragma </a:t>
-            </a:r>
-            <a:r>
-              <a:rPr lang="en-US" b="1" dirty="0" err="1" smtClean="0">
-                <a:solidFill>
-                  <a:srgbClr val="0000FF"/>
-                </a:solidFill>
-                <a:latin typeface="Andale Mono"/>
-                <a:cs typeface="Andale Mono"/>
-              </a:rPr>
-              <a:t>omp</a:t>
-            </a:r>
-            <a:r>
-              <a:rPr lang="en-US" b="1" dirty="0" smtClean="0">
-                <a:solidFill>
-                  <a:srgbClr val="0000FF"/>
-                </a:solidFill>
-                <a:latin typeface="Andale Mono"/>
-                <a:cs typeface="Andale Mono"/>
-              </a:rPr>
-              <a:t> parallel for</a:t>
-            </a:r>
-          </a:p>
-          <a:p>
-            <a:r>
-              <a:rPr lang="en-US" dirty="0" smtClean="0">
-                <a:latin typeface="Andale Mono"/>
-                <a:cs typeface="Andale Mono"/>
-              </a:rPr>
-              <a:t>for(</a:t>
-            </a:r>
-            <a:r>
-              <a:rPr lang="en-US" dirty="0" err="1" smtClean="0">
-                <a:latin typeface="Andale Mono"/>
-                <a:cs typeface="Andale Mono"/>
-              </a:rPr>
-              <a:t>int</a:t>
-            </a:r>
-            <a:r>
-              <a:rPr lang="en-US" dirty="0" smtClean="0">
-                <a:latin typeface="Andale Mono"/>
-                <a:cs typeface="Andale Mono"/>
-              </a:rPr>
-              <a:t> </a:t>
-            </a:r>
-            <a:r>
-              <a:rPr lang="en-US" dirty="0" err="1" smtClean="0">
-                <a:latin typeface="Andale Mono"/>
-                <a:cs typeface="Andale Mono"/>
-              </a:rPr>
-              <a:t>i</a:t>
-            </a:r>
-            <a:r>
-              <a:rPr lang="en-US" dirty="0" smtClean="0">
-                <a:latin typeface="Andale Mono"/>
-                <a:cs typeface="Andale Mono"/>
-              </a:rPr>
-              <a:t> = 1; </a:t>
-            </a:r>
-            <a:r>
-              <a:rPr lang="en-US" dirty="0" err="1" smtClean="0">
-                <a:latin typeface="Andale Mono"/>
-                <a:cs typeface="Andale Mono"/>
-              </a:rPr>
-              <a:t>i</a:t>
-            </a:r>
-            <a:r>
-              <a:rPr lang="en-US" dirty="0" smtClean="0">
-                <a:latin typeface="Andale Mono"/>
-                <a:cs typeface="Andale Mono"/>
-              </a:rPr>
-              <a:t> &lt; N; </a:t>
-            </a:r>
-            <a:r>
-              <a:rPr lang="en-US" dirty="0" err="1" smtClean="0">
-                <a:latin typeface="Andale Mono"/>
-                <a:cs typeface="Andale Mono"/>
-              </a:rPr>
-              <a:t>i</a:t>
-            </a:r>
-            <a:r>
-              <a:rPr lang="en-US" dirty="0" smtClean="0">
-                <a:latin typeface="Andale Mono"/>
-                <a:cs typeface="Andale Mono"/>
-              </a:rPr>
-              <a:t>++) {</a:t>
-            </a:r>
-          </a:p>
-          <a:p>
-            <a:r>
-              <a:rPr lang="en-US" dirty="0">
-                <a:latin typeface="Andale Mono"/>
-                <a:cs typeface="Andale Mono"/>
-              </a:rPr>
-              <a:t> </a:t>
-            </a:r>
-            <a:r>
-              <a:rPr lang="en-US" dirty="0" smtClean="0">
-                <a:latin typeface="Andale Mono"/>
-                <a:cs typeface="Andale Mono"/>
-              </a:rPr>
-              <a:t>  a[</a:t>
-            </a:r>
-            <a:r>
-              <a:rPr lang="en-US" dirty="0" err="1" smtClean="0">
-                <a:latin typeface="Andale Mono"/>
-                <a:cs typeface="Andale Mono"/>
-              </a:rPr>
-              <a:t>i</a:t>
-            </a:r>
-            <a:r>
-              <a:rPr lang="en-US" dirty="0" smtClean="0">
-                <a:latin typeface="Andale Mono"/>
-                <a:cs typeface="Andale Mono"/>
-              </a:rPr>
-              <a:t>] = a[</a:t>
-            </a:r>
-            <a:r>
-              <a:rPr lang="en-US" dirty="0" err="1" smtClean="0">
-                <a:latin typeface="Andale Mono"/>
-                <a:cs typeface="Andale Mono"/>
-              </a:rPr>
-              <a:t>i</a:t>
-            </a:r>
-            <a:r>
-              <a:rPr lang="en-US" dirty="0" smtClean="0">
-                <a:latin typeface="Andale Mono"/>
-                <a:cs typeface="Andale Mono"/>
-              </a:rPr>
-              <a:t> - 1];</a:t>
-            </a:r>
-          </a:p>
-          <a:p>
-            <a:r>
-              <a:rPr lang="en-US" dirty="0">
-                <a:latin typeface="Andale Mono"/>
-                <a:cs typeface="Andale Mono"/>
-              </a:rPr>
-              <a:t>}</a:t>
-            </a:r>
-          </a:p>
-        </p:txBody>
-      </p:sp>
-      <p:sp>
-        <p:nvSpPr>
           <p:cNvPr id="2" name="Title 1"/>
           <p:cNvSpPr>
             <a:spLocks noGrp="1"/>
@@ -5607,15 +6973,23 @@
           <a:p>
             <a:pPr algn="l"/>
             <a:r>
+              <a:rPr lang="en-US" sz="4900" dirty="0" smtClean="0"/>
+              <a:t>State of the art</a:t>
+            </a:r>
+            <a:r>
               <a:rPr lang="en-US" dirty="0" smtClean="0"/>
-              <a:t>Static Analysis</a:t>
+              <a:t/>
             </a:r>
             <a:br>
               <a:rPr lang="en-US" dirty="0" smtClean="0"/>
             </a:br>
             <a:r>
-              <a:rPr lang="en-US" sz="2700" dirty="0" smtClean="0"/>
-              <a:t>Data Dependency Analysis</a:t>
+              <a:rPr lang="en-US" sz="2800" dirty="0"/>
+              <a:t>Static Data Race </a:t>
+            </a:r>
+            <a:r>
+              <a:rPr lang="en-US" sz="2800" dirty="0" smtClean="0"/>
+              <a:t>Detection Techniques</a:t>
             </a:r>
             <a:endParaRPr lang="en-US" sz="2700" dirty="0"/>
           </a:p>
@@ -5623,7 +6997,7 @@
       </p:sp>
       <p:sp>
         <p:nvSpPr>
-          <p:cNvPr id="11" name="Content Placeholder 15"/>
+          <p:cNvPr id="4" name="Content Placeholder 3"/>
           <p:cNvSpPr>
             <a:spLocks noGrp="1"/>
           </p:cNvSpPr>
@@ -5631,226 +7005,92 @@
             <p:ph idx="1"/>
           </p:nvPr>
         </p:nvSpPr>
-        <p:spPr>
-          <a:xfrm>
-            <a:off x="457200" y="1608151"/>
-            <a:ext cx="8229600" cy="1539673"/>
-          </a:xfrm>
-        </p:spPr>
+        <p:spPr/>
         <p:txBody>
           <a:bodyPr>
-            <a:noAutofit/>
+            <a:normAutofit fontScale="92500" lnSpcReduction="20000"/>
           </a:bodyPr>
           <a:lstStyle/>
           <a:p>
-            <a:r>
-              <a:rPr lang="en-US" sz="2800" dirty="0"/>
-              <a:t>Loop-carried data dependency </a:t>
-            </a:r>
-            <a:r>
-              <a:rPr lang="en-US" sz="2800" dirty="0" smtClean="0"/>
-              <a:t>analysis:</a:t>
-            </a:r>
+            <a:pPr>
+              <a:lnSpc>
+                <a:spcPct val="150000"/>
+              </a:lnSpc>
+            </a:pPr>
+            <a:r>
+              <a:rPr lang="en-US" dirty="0"/>
+              <a:t>Static Analysis</a:t>
+            </a:r>
+          </a:p>
+          <a:p>
+            <a:pPr lvl="1">
+              <a:lnSpc>
+                <a:spcPct val="150000"/>
+              </a:lnSpc>
+            </a:pPr>
+            <a:r>
+              <a:rPr lang="en-US" dirty="0"/>
+              <a:t>Reason about all inputs/</a:t>
+            </a:r>
+            <a:r>
+              <a:rPr lang="en-US" dirty="0" err="1"/>
+              <a:t>interleavings</a:t>
+            </a:r>
+            <a:endParaRPr lang="en-US" dirty="0"/>
           </a:p>
           <a:p>
             <a:pPr lvl="1"/>
             <a:r>
-              <a:rPr lang="en-US" sz="2400" dirty="0" smtClean="0"/>
-              <a:t>Parallel </a:t>
-            </a:r>
-            <a:r>
-              <a:rPr lang="en-US" sz="2400" dirty="0"/>
-              <a:t>for-loops with no dependencies are race </a:t>
-            </a:r>
-            <a:r>
-              <a:rPr lang="en-US" sz="2400" dirty="0" smtClean="0"/>
-              <a:t>free</a:t>
-            </a:r>
-          </a:p>
-          <a:p>
-            <a:pPr lvl="1"/>
-            <a:r>
-              <a:rPr lang="en-US" sz="2400" dirty="0" smtClean="0"/>
-              <a:t>Blacklisting these regions from runtime analysis</a:t>
-            </a:r>
-            <a:endParaRPr lang="en-US" sz="2400" dirty="0">
-              <a:effectLst/>
-            </a:endParaRPr>
-          </a:p>
-        </p:txBody>
-      </p:sp>
-      <p:sp>
-        <p:nvSpPr>
-          <p:cNvPr id="3" name="Rectangle 2"/>
-          <p:cNvSpPr/>
-          <p:nvPr/>
-        </p:nvSpPr>
-        <p:spPr>
-          <a:xfrm>
-            <a:off x="4479667" y="3290501"/>
-            <a:ext cx="184666" cy="276999"/>
-          </a:xfrm>
-          <a:prstGeom prst="rect">
-            <a:avLst/>
-          </a:prstGeom>
-        </p:spPr>
-        <p:txBody>
-          <a:bodyPr wrap="none">
-            <a:spAutoFit/>
-          </a:bodyPr>
-          <a:lstStyle/>
-          <a:p>
-            <a:r>
-              <a:rPr lang="en-US" baseline="30000" dirty="0"/>
-              <a:t> </a:t>
-            </a:r>
-            <a:endParaRPr lang="en-US" dirty="0"/>
-          </a:p>
-        </p:txBody>
-      </p:sp>
-      <p:sp>
-        <p:nvSpPr>
-          <p:cNvPr id="6" name="Right Brace 5"/>
-          <p:cNvSpPr/>
-          <p:nvPr/>
-        </p:nvSpPr>
-        <p:spPr>
-          <a:xfrm>
-            <a:off x="4563835" y="3419669"/>
-            <a:ext cx="256721" cy="1200329"/>
-          </a:xfrm>
-          <a:prstGeom prst="rightBrace">
-            <a:avLst/>
-          </a:prstGeom>
-          <a:ln>
-            <a:solidFill>
-              <a:schemeClr val="tx1"/>
-            </a:solidFill>
-          </a:ln>
-          <a:effectLst/>
-        </p:spPr>
-        <p:style>
-          <a:lnRef idx="2">
-            <a:schemeClr val="accent1"/>
-          </a:lnRef>
-          <a:fillRef idx="0">
-            <a:schemeClr val="accent1"/>
-          </a:fillRef>
-          <a:effectRef idx="1">
-            <a:schemeClr val="accent1"/>
-          </a:effectRef>
-          <a:fontRef idx="minor">
-            <a:schemeClr val="tx1"/>
-          </a:fontRef>
-        </p:style>
-        <p:txBody>
-          <a:bodyPr rtlCol="0" anchor="ctr"/>
-          <a:lstStyle/>
-          <a:p>
-            <a:pPr algn="ctr"/>
-            <a:endParaRPr lang="en-US"/>
-          </a:p>
-        </p:txBody>
-      </p:sp>
-      <p:sp>
-        <p:nvSpPr>
-          <p:cNvPr id="9" name="Right Brace 8"/>
-          <p:cNvSpPr/>
-          <p:nvPr/>
-        </p:nvSpPr>
-        <p:spPr>
-          <a:xfrm>
-            <a:off x="4563835" y="4936660"/>
-            <a:ext cx="256721" cy="1200329"/>
-          </a:xfrm>
-          <a:prstGeom prst="rightBrace">
-            <a:avLst/>
-          </a:prstGeom>
-          <a:ln>
-            <a:solidFill>
-              <a:schemeClr val="tx1"/>
-            </a:solidFill>
-          </a:ln>
-          <a:effectLst/>
-        </p:spPr>
-        <p:style>
-          <a:lnRef idx="2">
-            <a:schemeClr val="accent1"/>
-          </a:lnRef>
-          <a:fillRef idx="0">
-            <a:schemeClr val="accent1"/>
-          </a:fillRef>
-          <a:effectRef idx="1">
-            <a:schemeClr val="accent1"/>
-          </a:effectRef>
-          <a:fontRef idx="minor">
-            <a:schemeClr val="tx1"/>
-          </a:fontRef>
-        </p:style>
-        <p:txBody>
-          <a:bodyPr rtlCol="0" anchor="ctr"/>
-          <a:lstStyle/>
-          <a:p>
-            <a:pPr algn="ctr"/>
-            <a:endParaRPr lang="en-US"/>
-          </a:p>
-        </p:txBody>
-      </p:sp>
-      <p:sp>
-        <p:nvSpPr>
-          <p:cNvPr id="8" name="TextBox 7"/>
-          <p:cNvSpPr txBox="1"/>
-          <p:nvPr/>
-        </p:nvSpPr>
-        <p:spPr>
-          <a:xfrm>
-            <a:off x="5201980" y="3689089"/>
-            <a:ext cx="3484820" cy="646331"/>
-          </a:xfrm>
-          <a:prstGeom prst="rect">
-            <a:avLst/>
-          </a:prstGeom>
-          <a:noFill/>
-        </p:spPr>
-        <p:txBody>
-          <a:bodyPr wrap="square" rtlCol="0">
-            <a:spAutoFit/>
-          </a:bodyPr>
-          <a:lstStyle/>
-          <a:p>
+              <a:rPr lang="en-US" dirty="0"/>
+              <a:t>Very imprecise, many “false positives” and “false negatives” (miss races)</a:t>
+            </a:r>
+          </a:p>
+          <a:p>
+            <a:pPr lvl="1">
+              <a:lnSpc>
+                <a:spcPct val="150000"/>
+              </a:lnSpc>
+            </a:pPr>
+            <a:r>
+              <a:rPr lang="en-US" dirty="0"/>
+              <a:t>Very scalable and fast (i.e. no runtime overhead)</a:t>
+            </a:r>
+          </a:p>
+          <a:p>
+            <a:pPr>
+              <a:lnSpc>
+                <a:spcPct val="150000"/>
+              </a:lnSpc>
+            </a:pPr>
+            <a:r>
+              <a:rPr lang="en-US" dirty="0"/>
+              <a:t>Example Tools:</a:t>
+            </a:r>
+          </a:p>
+          <a:p>
+            <a:pPr lvl="1">
+              <a:lnSpc>
+                <a:spcPct val="150000"/>
+              </a:lnSpc>
+            </a:pPr>
+            <a:r>
+              <a:rPr lang="en-US" dirty="0"/>
+              <a:t>Intel Static Security Analysis</a:t>
+            </a:r>
+          </a:p>
+          <a:p>
+            <a:pPr lvl="2">
+              <a:lnSpc>
+                <a:spcPct val="150000"/>
+              </a:lnSpc>
+            </a:pPr>
+            <a:r>
+              <a:rPr lang="en-US" dirty="0"/>
+              <a:t>Support C/C++ and </a:t>
+            </a:r>
             <a:r>
               <a:rPr lang="en-US" dirty="0" smtClean="0"/>
-              <a:t>No data dependency, code can be excluded from runtime analysis</a:t>
-            </a:r>
-            <a:endParaRPr lang="en-US" dirty="0"/>
-          </a:p>
-        </p:txBody>
-      </p:sp>
-      <p:sp>
-        <p:nvSpPr>
-          <p:cNvPr id="12" name="TextBox 11"/>
-          <p:cNvSpPr txBox="1"/>
-          <p:nvPr/>
-        </p:nvSpPr>
-        <p:spPr>
-          <a:xfrm>
-            <a:off x="5201980" y="5070897"/>
-            <a:ext cx="3484820" cy="923330"/>
-          </a:xfrm>
-          <a:prstGeom prst="rect">
-            <a:avLst/>
-          </a:prstGeom>
-          <a:noFill/>
-        </p:spPr>
-        <p:txBody>
-          <a:bodyPr wrap="square" rtlCol="0">
-            <a:spAutoFit/>
-          </a:bodyPr>
-          <a:lstStyle/>
-          <a:p>
-            <a:r>
-              <a:rPr lang="en-US" dirty="0" smtClean="0"/>
-              <a:t>Data dependency on array access, potentially race therefore checked at runtime</a:t>
+              <a:t>Fortran</a:t>
             </a:r>
             <a:endParaRPr lang="en-US" dirty="0"/>
           </a:p>
@@ -5859,7 +7099,7 @@
     </p:spTree>
     <p:extLst>
       <p:ext uri="{BB962C8B-B14F-4D97-AF65-F5344CB8AC3E}">
-        <p14:creationId xmlns:p14="http://schemas.microsoft.com/office/powerpoint/2010/main" val="1249774231"/>
+        <p14:creationId xmlns:p14="http://schemas.microsoft.com/office/powerpoint/2010/main" val="1398622825"/>
       </p:ext>
     </p:extLst>
   </p:cSld>
@@ -5912,140 +7152,433 @@
           <a:p>
             <a:pPr algn="l"/>
             <a:r>
+              <a:rPr lang="en-US" sz="4900" dirty="0" smtClean="0"/>
+              <a:t>State of the art</a:t>
+            </a:r>
+            <a:r>
               <a:rPr lang="en-US" dirty="0" smtClean="0"/>
-              <a:t>Archer v1</a:t>
+              <a:t/>
             </a:r>
             <a:br>
               <a:rPr lang="en-US" dirty="0" smtClean="0"/>
             </a:br>
             <a:r>
-              <a:rPr lang="en-US" sz="2700" dirty="0" smtClean="0"/>
-              <a:t>Combining Static and Dynamic Analysis</a:t>
+              <a:rPr lang="en-US" sz="2800" dirty="0" smtClean="0"/>
+              <a:t>Dynamic Data </a:t>
+            </a:r>
+            <a:r>
+              <a:rPr lang="en-US" sz="2800" dirty="0"/>
+              <a:t>Race </a:t>
+            </a:r>
+            <a:r>
+              <a:rPr lang="en-US" sz="2800" dirty="0" smtClean="0"/>
+              <a:t>Detection Techniques</a:t>
             </a:r>
             <a:endParaRPr lang="en-US" sz="2700" dirty="0"/>
           </a:p>
         </p:txBody>
       </p:sp>
-      <p:pic>
-        <p:nvPicPr>
-          <p:cNvPr id="17" name="Picture 16" descr="archerdiagram.pdf"/>
-          <p:cNvPicPr>
-            <a:picLocks noChangeAspect="1"/>
-          </p:cNvPicPr>
-          <p:nvPr/>
-        </p:nvPicPr>
-        <p:blipFill>
-          <a:blip r:embed="rId3">
-            <a:extLst>
-              <a:ext uri="{28A0092B-C50C-407E-A947-70E740481C1C}">
-                <a14:useLocalDpi xmlns:a14="http://schemas.microsoft.com/office/drawing/2010/main" val="0"/>
-              </a:ext>
-            </a:extLst>
-          </a:blip>
-          <a:stretch>
-            <a:fillRect/>
-          </a:stretch>
-        </p:blipFill>
+      <p:sp>
+        <p:nvSpPr>
+          <p:cNvPr id="4" name="Content Placeholder 3"/>
+          <p:cNvSpPr>
+            <a:spLocks noGrp="1"/>
+          </p:cNvSpPr>
+          <p:nvPr>
+            <p:ph idx="1"/>
+          </p:nvPr>
+        </p:nvSpPr>
+        <p:spPr/>
+        <p:txBody>
+          <a:bodyPr>
+            <a:normAutofit fontScale="70000" lnSpcReduction="20000"/>
+          </a:bodyPr>
+          <a:lstStyle/>
+          <a:p>
+            <a:pPr>
+              <a:lnSpc>
+                <a:spcPct val="150000"/>
+              </a:lnSpc>
+            </a:pPr>
+            <a:r>
+              <a:rPr lang="en-US" dirty="0"/>
+              <a:t>Dynamic Analysis</a:t>
+            </a:r>
+          </a:p>
+          <a:p>
+            <a:pPr lvl="1">
+              <a:lnSpc>
+                <a:spcPct val="150000"/>
+              </a:lnSpc>
+            </a:pPr>
+            <a:r>
+              <a:rPr lang="en-US" dirty="0"/>
+              <a:t>Very precise, no false positives</a:t>
+            </a:r>
+          </a:p>
+          <a:p>
+            <a:pPr lvl="1"/>
+            <a:r>
+              <a:rPr lang="en-US" dirty="0"/>
+              <a:t>Reports races only in branches of the programs that are actually executed</a:t>
+            </a:r>
+          </a:p>
+          <a:p>
+            <a:pPr lvl="1"/>
+            <a:r>
+              <a:rPr lang="en-US" dirty="0"/>
+              <a:t>Very high runtime and memory overhead (5-20x for best tools)</a:t>
+            </a:r>
+          </a:p>
+          <a:p>
+            <a:pPr>
+              <a:lnSpc>
+                <a:spcPct val="150000"/>
+              </a:lnSpc>
+            </a:pPr>
+            <a:r>
+              <a:rPr lang="en-US" dirty="0"/>
+              <a:t>Example Techniques:</a:t>
+            </a:r>
+          </a:p>
+          <a:p>
+            <a:pPr lvl="1">
+              <a:lnSpc>
+                <a:spcPct val="150000"/>
+              </a:lnSpc>
+            </a:pPr>
+            <a:r>
+              <a:rPr lang="en-US" dirty="0"/>
+              <a:t>Lockset Algorithm</a:t>
+            </a:r>
+          </a:p>
+          <a:p>
+            <a:pPr lvl="1">
+              <a:lnSpc>
+                <a:spcPct val="150000"/>
+              </a:lnSpc>
+            </a:pPr>
+            <a:r>
+              <a:rPr lang="en-US" dirty="0"/>
+              <a:t>Happens-Before Relation</a:t>
+            </a:r>
+          </a:p>
+          <a:p>
+            <a:pPr lvl="1">
+              <a:lnSpc>
+                <a:spcPct val="150000"/>
+              </a:lnSpc>
+            </a:pPr>
+            <a:r>
+              <a:rPr lang="en-US" dirty="0"/>
+              <a:t>Hybrid data race detection </a:t>
+            </a:r>
+          </a:p>
+          <a:p>
+            <a:pPr lvl="2">
+              <a:lnSpc>
+                <a:spcPct val="150000"/>
+              </a:lnSpc>
+            </a:pPr>
+            <a:r>
+              <a:rPr lang="en-US" dirty="0"/>
+              <a:t>combination of lockset and happens-before relation</a:t>
+            </a:r>
+            <a:endParaRPr lang="en-US" dirty="0"/>
+          </a:p>
+        </p:txBody>
+      </p:sp>
+    </p:spTree>
+    <p:extLst>
+      <p:ext uri="{BB962C8B-B14F-4D97-AF65-F5344CB8AC3E}">
+        <p14:creationId xmlns:p14="http://schemas.microsoft.com/office/powerpoint/2010/main" val="1338262420"/>
+      </p:ext>
+    </p:extLst>
+  </p:cSld>
+  <p:clrMapOvr>
+    <a:masterClrMapping/>
+  </p:clrMapOvr>
+  <p:timing>
+    <p:tnLst>
+      <p:par>
+        <p:cTn xmlns:p14="http://schemas.microsoft.com/office/powerpoint/2010/main" id="1" dur="indefinite" restart="never" nodeType="tmRoot"/>
+      </p:par>
+    </p:tnLst>
+  </p:timing>
+</p:sld>
+</file>
+
+<file path=ppt/slides/slide9.xml><?xml version="1.0" encoding="utf-8"?>
+<p:sld xmlns:a="http://schemas.openxmlformats.org/drawingml/2006/main" xmlns:r="http://schemas.openxmlformats.org/officeDocument/2006/relationships" xmlns:p="http://schemas.openxmlformats.org/presentationml/2006/main">
+  <p:cSld>
+    <p:spTree>
+      <p:nvGrpSpPr>
+        <p:cNvPr id="1" name=""/>
+        <p:cNvGrpSpPr/>
+        <p:nvPr/>
+      </p:nvGrpSpPr>
+      <p:grpSpPr>
+        <a:xfrm>
+          <a:off x="0" y="0"/>
+          <a:ext cx="0" cy="0"/>
+          <a:chOff x="0" y="0"/>
+          <a:chExt cx="0" cy="0"/>
+        </a:xfrm>
+      </p:grpSpPr>
+      <p:sp>
+        <p:nvSpPr>
+          <p:cNvPr id="2" name="Title 1"/>
+          <p:cNvSpPr>
+            <a:spLocks noGrp="1"/>
+          </p:cNvSpPr>
+          <p:nvPr>
+            <p:ph type="title"/>
+          </p:nvPr>
+        </p:nvSpPr>
+        <p:spPr/>
+        <p:txBody>
+          <a:bodyPr>
+            <a:normAutofit fontScale="90000"/>
+          </a:bodyPr>
+          <a:lstStyle/>
+          <a:p>
+            <a:pPr algn="l"/>
+            <a:r>
+              <a:rPr lang="en-US" sz="4900" dirty="0" smtClean="0"/>
+              <a:t>State of the art</a:t>
+            </a:r>
+            <a:r>
+              <a:rPr lang="en-US" dirty="0" smtClean="0"/>
+              <a:t/>
+            </a:r>
+            <a:br>
+              <a:rPr lang="en-US" dirty="0" smtClean="0"/>
+            </a:br>
+            <a:r>
+              <a:rPr lang="en-US" sz="2800" dirty="0" smtClean="0"/>
+              <a:t>Dynamic Data </a:t>
+            </a:r>
+            <a:r>
+              <a:rPr lang="en-US" sz="2800" dirty="0"/>
+              <a:t>Race </a:t>
+            </a:r>
+            <a:r>
+              <a:rPr lang="en-US" sz="2800" dirty="0" smtClean="0"/>
+              <a:t>Detection Tools</a:t>
+            </a:r>
+            <a:endParaRPr lang="en-US" sz="2700" dirty="0"/>
+          </a:p>
+        </p:txBody>
+      </p:sp>
+      <p:sp>
+        <p:nvSpPr>
+          <p:cNvPr id="4" name="Content Placeholder 3"/>
+          <p:cNvSpPr>
+            <a:spLocks noGrp="1"/>
+          </p:cNvSpPr>
+          <p:nvPr>
+            <p:ph idx="1"/>
+          </p:nvPr>
+        </p:nvSpPr>
         <p:spPr>
           <a:xfrm>
-            <a:off x="457200" y="1611310"/>
-            <a:ext cx="8229600" cy="2307885"/>
+            <a:off x="457200" y="1600200"/>
+            <a:ext cx="8229600" cy="4114519"/>
+          </a:xfrm>
+        </p:spPr>
+        <p:txBody>
+          <a:bodyPr>
+            <a:normAutofit/>
+          </a:bodyPr>
+          <a:lstStyle/>
+          <a:p>
+            <a:pPr>
+              <a:lnSpc>
+                <a:spcPct val="150000"/>
+              </a:lnSpc>
+            </a:pPr>
+            <a:r>
+              <a:rPr lang="en-US" sz="2400" dirty="0"/>
+              <a:t>Not </a:t>
+            </a:r>
+            <a:r>
+              <a:rPr lang="en-US" sz="2400" dirty="0" smtClean="0"/>
+              <a:t>many (OpenMP) </a:t>
+            </a:r>
+            <a:r>
+              <a:rPr lang="en-US" sz="2400" dirty="0"/>
+              <a:t>data race detectors out there!</a:t>
+            </a:r>
+          </a:p>
+          <a:p>
+            <a:pPr>
+              <a:lnSpc>
+                <a:spcPct val="150000"/>
+              </a:lnSpc>
+            </a:pPr>
+            <a:r>
+              <a:rPr lang="en-US" sz="2400" dirty="0"/>
+              <a:t>Commercial tools:</a:t>
+            </a:r>
+          </a:p>
+          <a:p>
+            <a:pPr lvl="1">
+              <a:lnSpc>
+                <a:spcPct val="150000"/>
+              </a:lnSpc>
+            </a:pPr>
+            <a:r>
+              <a:rPr lang="en-US" sz="2000" dirty="0"/>
+              <a:t>Intel Inspector XE: </a:t>
+            </a:r>
+            <a:r>
+              <a:rPr lang="en-US" sz="2000" dirty="0" err="1"/>
+              <a:t>Pthread</a:t>
+            </a:r>
+            <a:r>
+              <a:rPr lang="en-US" sz="2000" dirty="0"/>
+              <a:t> and OpenMP C/C++ and Fortran</a:t>
+            </a:r>
+            <a:endParaRPr lang="en-US" sz="1200" dirty="0"/>
+          </a:p>
+          <a:p>
+            <a:pPr lvl="1">
+              <a:lnSpc>
+                <a:spcPct val="150000"/>
+              </a:lnSpc>
+            </a:pPr>
+            <a:r>
+              <a:rPr lang="en-US" sz="2000" dirty="0"/>
+              <a:t>Sun Studio Data-Race Detection Tool: </a:t>
+            </a:r>
+            <a:r>
+              <a:rPr lang="en-US" sz="2000" dirty="0" err="1"/>
+              <a:t>Pthread</a:t>
+            </a:r>
+            <a:r>
+              <a:rPr lang="en-US" sz="2000" dirty="0"/>
+              <a:t> and OpenMP C/C+</a:t>
+            </a:r>
+            <a:r>
+              <a:rPr lang="en-US" sz="2000" dirty="0" smtClean="0"/>
+              <a:t>+</a:t>
+            </a:r>
+            <a:endParaRPr lang="en-US" sz="1600" dirty="0"/>
+          </a:p>
+          <a:p>
+            <a:pPr>
+              <a:lnSpc>
+                <a:spcPct val="150000"/>
+              </a:lnSpc>
+            </a:pPr>
+            <a:r>
+              <a:rPr lang="en-US" sz="2400" dirty="0"/>
+              <a:t>Open-source tools:</a:t>
+            </a:r>
+          </a:p>
+          <a:p>
+            <a:pPr lvl="1">
+              <a:lnSpc>
+                <a:spcPct val="150000"/>
+              </a:lnSpc>
+            </a:pPr>
+            <a:r>
+              <a:rPr lang="en-US" sz="2000" dirty="0" err="1"/>
+              <a:t>Helgrind</a:t>
+            </a:r>
+            <a:r>
+              <a:rPr lang="en-US" sz="2000" dirty="0"/>
+              <a:t> (based on </a:t>
+            </a:r>
+            <a:r>
+              <a:rPr lang="en-US" sz="2000" dirty="0" err="1"/>
+              <a:t>Valgrind</a:t>
+            </a:r>
+            <a:r>
+              <a:rPr lang="en-US" sz="2000" dirty="0"/>
+              <a:t>): </a:t>
+            </a:r>
+            <a:r>
+              <a:rPr lang="en-US" sz="2000" dirty="0" err="1"/>
+              <a:t>Pthread</a:t>
+            </a:r>
+            <a:r>
+              <a:rPr lang="en-US" sz="2000" dirty="0"/>
+              <a:t> C/C++ and Fortran</a:t>
+            </a:r>
+          </a:p>
+          <a:p>
+            <a:pPr lvl="1">
+              <a:lnSpc>
+                <a:spcPct val="150000"/>
+              </a:lnSpc>
+            </a:pPr>
+            <a:r>
+              <a:rPr lang="en-US" sz="2000" dirty="0"/>
+              <a:t>Thread Sanitizer: </a:t>
+            </a:r>
+            <a:r>
+              <a:rPr lang="en-US" sz="2000" dirty="0" err="1"/>
+              <a:t>Pthread</a:t>
+            </a:r>
+            <a:r>
+              <a:rPr lang="en-US" sz="2000" dirty="0"/>
+              <a:t> C/C++ and </a:t>
+            </a:r>
+            <a:r>
+              <a:rPr lang="en-US" sz="2000" dirty="0" smtClean="0"/>
+              <a:t>Go</a:t>
+            </a:r>
+            <a:endParaRPr lang="en-US" sz="2000" dirty="0"/>
+          </a:p>
+        </p:txBody>
+      </p:sp>
+      <p:sp>
+        <p:nvSpPr>
+          <p:cNvPr id="3" name="TextBox 2"/>
+          <p:cNvSpPr txBox="1"/>
+          <p:nvPr/>
+        </p:nvSpPr>
+        <p:spPr>
+          <a:xfrm>
+            <a:off x="457200" y="5591231"/>
+            <a:ext cx="8229599" cy="1077218"/>
           </a:xfrm>
           <a:prstGeom prst="rect">
             <a:avLst/>
           </a:prstGeom>
+          <a:noFill/>
         </p:spPr>
-      </p:pic>
-      <p:sp>
-        <p:nvSpPr>
-          <p:cNvPr id="19" name="Content Placeholder 15"/>
-          <p:cNvSpPr>
-            <a:spLocks noGrp="1"/>
-          </p:cNvSpPr>
-          <p:nvPr>
-            <p:ph idx="1"/>
-          </p:nvPr>
-        </p:nvSpPr>
-        <p:spPr>
-          <a:xfrm>
-            <a:off x="457200" y="3919195"/>
-            <a:ext cx="8229600" cy="2579102"/>
-          </a:xfrm>
-        </p:spPr>
-        <p:txBody>
-          <a:bodyPr>
-            <a:noAutofit/>
+        <p:txBody>
+          <a:bodyPr wrap="square" rtlCol="0">
+            <a:spAutoFit/>
           </a:bodyPr>
           <a:lstStyle/>
           <a:p>
-            <a:r>
-              <a:rPr lang="en-US" sz="2400" dirty="0" smtClean="0">
-                <a:effectLst/>
-              </a:rPr>
-              <a:t>LLVM/Clang based tool</a:t>
-            </a:r>
-          </a:p>
-          <a:p>
-            <a:r>
-              <a:rPr lang="en-US" sz="2400" dirty="0" err="1" smtClean="0"/>
-              <a:t>TSan</a:t>
-            </a:r>
-            <a:r>
-              <a:rPr lang="en-US" sz="2400" dirty="0" smtClean="0"/>
-              <a:t> data race runtime analysis</a:t>
-            </a:r>
-          </a:p>
-          <a:p>
-            <a:r>
-              <a:rPr lang="en-US" sz="2400" dirty="0" smtClean="0"/>
-              <a:t>Instrumented OpenMP runtime</a:t>
-            </a:r>
-          </a:p>
-          <a:p>
-            <a:pPr lvl="1"/>
-            <a:r>
-              <a:rPr lang="en-US" sz="2000" dirty="0" smtClean="0">
-                <a:effectLst/>
-              </a:rPr>
-              <a:t>Annotations mechanism to communicate </a:t>
-            </a:r>
-            <a:r>
-              <a:rPr lang="en-US" sz="2000" dirty="0" err="1" smtClean="0">
-                <a:effectLst/>
-              </a:rPr>
-              <a:t>TSan</a:t>
-            </a:r>
-            <a:r>
-              <a:rPr lang="en-US" sz="2000" dirty="0" smtClean="0">
-                <a:effectLst/>
-              </a:rPr>
-              <a:t> runtime about happens-before relations between threads</a:t>
-            </a:r>
-          </a:p>
-          <a:p>
-            <a:pPr lvl="1"/>
-            <a:r>
-              <a:rPr lang="en-US" sz="2000" dirty="0" smtClean="0"/>
-              <a:t>Unknown synchronization mechanism (i.e. barriers, </a:t>
-            </a:r>
-            <a:r>
-              <a:rPr lang="en-US" sz="2000" dirty="0" err="1" smtClean="0"/>
-              <a:t>criticals</a:t>
-            </a:r>
-            <a:r>
-              <a:rPr lang="en-US" sz="2000" dirty="0" smtClean="0"/>
-              <a:t>, etc</a:t>
-            </a:r>
-            <a:r>
-              <a:rPr lang="en-US" sz="2000" dirty="0"/>
-              <a:t>.</a:t>
-            </a:r>
-            <a:r>
-              <a:rPr lang="en-US" sz="2000" dirty="0" smtClean="0"/>
-              <a:t>)</a:t>
-            </a:r>
-            <a:endParaRPr lang="en-US" sz="2000" dirty="0">
-              <a:effectLst/>
+            <a:pPr algn="ctr"/>
+            <a:r>
+              <a:rPr lang="en-US" sz="3200" b="1" dirty="0" smtClean="0">
+                <a:solidFill>
+                  <a:srgbClr val="FF0000"/>
+                </a:solidFill>
+              </a:rPr>
+              <a:t>High runtime and memory overhead!</a:t>
+            </a:r>
+          </a:p>
+          <a:p>
+            <a:pPr algn="ctr"/>
+            <a:r>
+              <a:rPr lang="en-US" sz="3200" b="1" dirty="0" smtClean="0">
+                <a:solidFill>
+                  <a:srgbClr val="FF0000"/>
+                </a:solidFill>
+              </a:rPr>
+              <a:t>100x slower on HPC application!</a:t>
+            </a:r>
+            <a:endParaRPr lang="en-US" sz="3200" b="1" dirty="0">
+              <a:solidFill>
+                <a:srgbClr val="FF0000"/>
+              </a:solidFill>
             </a:endParaRPr>
           </a:p>
         </p:txBody>
@@ -6053,7 +7586,7 @@
     </p:spTree>
     <p:extLst>
       <p:ext uri="{BB962C8B-B14F-4D97-AF65-F5344CB8AC3E}">
-        <p14:creationId xmlns:p14="http://schemas.microsoft.com/office/powerpoint/2010/main" val="3598220810"/>
+        <p14:creationId xmlns:p14="http://schemas.microsoft.com/office/powerpoint/2010/main" val="4078461308"/>
       </p:ext>
     </p:extLst>
   </p:cSld>

</xml_diff>